<commit_message>
that conference slide changes
</commit_message>
<xml_diff>
--- a/slides/ThatMessageQueuesPresentation.pptx
+++ b/slides/ThatMessageQueuesPresentation.pptx
@@ -5,43 +5,42 @@
     <p:sldMasterId id="2147483648" r:id="rId1"/>
   </p:sldMasterIdLst>
   <p:notesMasterIdLst>
-    <p:notesMasterId r:id="rId36"/>
+    <p:notesMasterId r:id="rId35"/>
   </p:notesMasterIdLst>
   <p:sldIdLst>
     <p:sldId id="300" r:id="rId2"/>
-    <p:sldId id="299" r:id="rId3"/>
-    <p:sldId id="257" r:id="rId4"/>
+    <p:sldId id="257" r:id="rId3"/>
+    <p:sldId id="299" r:id="rId4"/>
     <p:sldId id="258" r:id="rId5"/>
     <p:sldId id="259" r:id="rId6"/>
     <p:sldId id="260" r:id="rId7"/>
     <p:sldId id="261" r:id="rId8"/>
-    <p:sldId id="262" r:id="rId9"/>
-    <p:sldId id="263" r:id="rId10"/>
+    <p:sldId id="263" r:id="rId9"/>
+    <p:sldId id="301" r:id="rId10"/>
     <p:sldId id="264" r:id="rId11"/>
-    <p:sldId id="265" r:id="rId12"/>
-    <p:sldId id="268" r:id="rId13"/>
-    <p:sldId id="266" r:id="rId14"/>
-    <p:sldId id="267" r:id="rId15"/>
-    <p:sldId id="269" r:id="rId16"/>
-    <p:sldId id="270" r:id="rId17"/>
-    <p:sldId id="271" r:id="rId18"/>
-    <p:sldId id="272" r:id="rId19"/>
-    <p:sldId id="273" r:id="rId20"/>
-    <p:sldId id="274" r:id="rId21"/>
-    <p:sldId id="275" r:id="rId22"/>
-    <p:sldId id="276" r:id="rId23"/>
-    <p:sldId id="289" r:id="rId24"/>
-    <p:sldId id="278" r:id="rId25"/>
-    <p:sldId id="290" r:id="rId26"/>
-    <p:sldId id="281" r:id="rId27"/>
-    <p:sldId id="282" r:id="rId28"/>
-    <p:sldId id="283" r:id="rId29"/>
-    <p:sldId id="284" r:id="rId30"/>
-    <p:sldId id="285" r:id="rId31"/>
-    <p:sldId id="291" r:id="rId32"/>
-    <p:sldId id="287" r:id="rId33"/>
-    <p:sldId id="296" r:id="rId34"/>
-    <p:sldId id="297" r:id="rId35"/>
+    <p:sldId id="268" r:id="rId12"/>
+    <p:sldId id="289" r:id="rId13"/>
+    <p:sldId id="278" r:id="rId14"/>
+    <p:sldId id="290" r:id="rId15"/>
+    <p:sldId id="266" r:id="rId16"/>
+    <p:sldId id="303" r:id="rId17"/>
+    <p:sldId id="267" r:id="rId18"/>
+    <p:sldId id="269" r:id="rId19"/>
+    <p:sldId id="284" r:id="rId20"/>
+    <p:sldId id="285" r:id="rId21"/>
+    <p:sldId id="291" r:id="rId22"/>
+    <p:sldId id="304" r:id="rId23"/>
+    <p:sldId id="305" r:id="rId24"/>
+    <p:sldId id="265" r:id="rId25"/>
+    <p:sldId id="302" r:id="rId26"/>
+    <p:sldId id="306" r:id="rId27"/>
+    <p:sldId id="307" r:id="rId28"/>
+    <p:sldId id="308" r:id="rId29"/>
+    <p:sldId id="309" r:id="rId30"/>
+    <p:sldId id="310" r:id="rId31"/>
+    <p:sldId id="287" r:id="rId32"/>
+    <p:sldId id="296" r:id="rId33"/>
+    <p:sldId id="297" r:id="rId34"/>
   </p:sldIdLst>
   <p:sldSz cx="12192000" cy="6858000"/>
   <p:notesSz cx="6858000" cy="9144000"/>
@@ -230,7 +229,7 @@
           <a:p>
             <a:fld id="{DCB88FB5-70BE-4595-A73B-4E335D030C14}" type="datetimeFigureOut">
               <a:rPr lang="en-US" smtClean="0"/>
-              <a:t>8/4/2015</a:t>
+              <a:t>8/6/2015</a:t>
             </a:fld>
             <a:endParaRPr lang="en-US" dirty="0"/>
           </a:p>
@@ -582,6 +581,90 @@
 </p:notes>
 </file>
 
+<file path=ppt/notesSlides/notesSlide2.xml><?xml version="1.0" encoding="utf-8"?>
+<p:notes xmlns:a="http://schemas.openxmlformats.org/drawingml/2006/main" xmlns:r="http://schemas.openxmlformats.org/officeDocument/2006/relationships" xmlns:p="http://schemas.openxmlformats.org/presentationml/2006/main">
+  <p:cSld>
+    <p:spTree>
+      <p:nvGrpSpPr>
+        <p:cNvPr id="1" name=""/>
+        <p:cNvGrpSpPr/>
+        <p:nvPr/>
+      </p:nvGrpSpPr>
+      <p:grpSpPr>
+        <a:xfrm>
+          <a:off x="0" y="0"/>
+          <a:ext cx="0" cy="0"/>
+          <a:chOff x="0" y="0"/>
+          <a:chExt cx="0" cy="0"/>
+        </a:xfrm>
+      </p:grpSpPr>
+      <p:sp>
+        <p:nvSpPr>
+          <p:cNvPr id="2" name="Slide Image Placeholder 1"/>
+          <p:cNvSpPr>
+            <a:spLocks noGrp="1" noRot="1" noChangeAspect="1"/>
+          </p:cNvSpPr>
+          <p:nvPr>
+            <p:ph type="sldImg"/>
+          </p:nvPr>
+        </p:nvSpPr>
+        <p:spPr/>
+      </p:sp>
+      <p:sp>
+        <p:nvSpPr>
+          <p:cNvPr id="3" name="Notes Placeholder 2"/>
+          <p:cNvSpPr>
+            <a:spLocks noGrp="1"/>
+          </p:cNvSpPr>
+          <p:nvPr>
+            <p:ph type="body" idx="1"/>
+          </p:nvPr>
+        </p:nvSpPr>
+        <p:spPr/>
+        <p:txBody>
+          <a:bodyPr/>
+          <a:lstStyle/>
+          <a:p>
+            <a:endParaRPr lang="en-US" dirty="0"/>
+          </a:p>
+        </p:txBody>
+      </p:sp>
+      <p:sp>
+        <p:nvSpPr>
+          <p:cNvPr id="4" name="Slide Number Placeholder 3"/>
+          <p:cNvSpPr>
+            <a:spLocks noGrp="1"/>
+          </p:cNvSpPr>
+          <p:nvPr>
+            <p:ph type="sldNum" sz="quarter" idx="10"/>
+          </p:nvPr>
+        </p:nvSpPr>
+        <p:spPr/>
+        <p:txBody>
+          <a:bodyPr/>
+          <a:lstStyle/>
+          <a:p>
+            <a:fld id="{35D36B66-2D2C-479A-BCE3-60C11FACD796}" type="slidenum">
+              <a:rPr lang="en-US" smtClean="0"/>
+              <a:t>33</a:t>
+            </a:fld>
+            <a:endParaRPr lang="en-US" dirty="0"/>
+          </a:p>
+        </p:txBody>
+      </p:sp>
+    </p:spTree>
+    <p:extLst>
+      <p:ext uri="{BB962C8B-B14F-4D97-AF65-F5344CB8AC3E}">
+        <p14:creationId xmlns:p14="http://schemas.microsoft.com/office/powerpoint/2010/main" val="535479589"/>
+      </p:ext>
+    </p:extLst>
+  </p:cSld>
+  <p:clrMapOvr>
+    <a:masterClrMapping/>
+  </p:clrMapOvr>
+</p:notes>
+</file>
+
 <file path=ppt/slideLayouts/slideLayout1.xml><?xml version="1.0" encoding="utf-8"?>
 <p:sldLayout xmlns:a="http://schemas.openxmlformats.org/drawingml/2006/main" xmlns:r="http://schemas.openxmlformats.org/officeDocument/2006/relationships" xmlns:p="http://schemas.openxmlformats.org/presentationml/2006/main" type="title" preserve="1">
   <p:cSld name="Title Slide">
@@ -713,7 +796,7 @@
           <a:p>
             <a:fld id="{39995FF6-0FDD-4A80-96B8-72BF71AD8DFB}" type="datetimeFigureOut">
               <a:rPr lang="en-US" smtClean="0"/>
-              <a:t>8/4/2015</a:t>
+              <a:t>8/6/2015</a:t>
             </a:fld>
             <a:endParaRPr lang="en-US" dirty="0"/>
           </a:p>
@@ -883,7 +966,7 @@
           <a:p>
             <a:fld id="{39995FF6-0FDD-4A80-96B8-72BF71AD8DFB}" type="datetimeFigureOut">
               <a:rPr lang="en-US" smtClean="0"/>
-              <a:t>8/4/2015</a:t>
+              <a:t>8/6/2015</a:t>
             </a:fld>
             <a:endParaRPr lang="en-US" dirty="0"/>
           </a:p>
@@ -1063,7 +1146,7 @@
           <a:p>
             <a:fld id="{39995FF6-0FDD-4A80-96B8-72BF71AD8DFB}" type="datetimeFigureOut">
               <a:rPr lang="en-US" smtClean="0"/>
-              <a:t>8/4/2015</a:t>
+              <a:t>8/6/2015</a:t>
             </a:fld>
             <a:endParaRPr lang="en-US" dirty="0"/>
           </a:p>
@@ -1233,7 +1316,7 @@
           <a:p>
             <a:fld id="{39995FF6-0FDD-4A80-96B8-72BF71AD8DFB}" type="datetimeFigureOut">
               <a:rPr lang="en-US" smtClean="0"/>
-              <a:t>8/4/2015</a:t>
+              <a:t>8/6/2015</a:t>
             </a:fld>
             <a:endParaRPr lang="en-US" dirty="0"/>
           </a:p>
@@ -1479,7 +1562,7 @@
           <a:p>
             <a:fld id="{39995FF6-0FDD-4A80-96B8-72BF71AD8DFB}" type="datetimeFigureOut">
               <a:rPr lang="en-US" smtClean="0"/>
-              <a:t>8/4/2015</a:t>
+              <a:t>8/6/2015</a:t>
             </a:fld>
             <a:endParaRPr lang="en-US" dirty="0"/>
           </a:p>
@@ -1711,7 +1794,7 @@
           <a:p>
             <a:fld id="{39995FF6-0FDD-4A80-96B8-72BF71AD8DFB}" type="datetimeFigureOut">
               <a:rPr lang="en-US" smtClean="0"/>
-              <a:t>8/4/2015</a:t>
+              <a:t>8/6/2015</a:t>
             </a:fld>
             <a:endParaRPr lang="en-US" dirty="0"/>
           </a:p>
@@ -2078,7 +2161,7 @@
           <a:p>
             <a:fld id="{39995FF6-0FDD-4A80-96B8-72BF71AD8DFB}" type="datetimeFigureOut">
               <a:rPr lang="en-US" smtClean="0"/>
-              <a:t>8/4/2015</a:t>
+              <a:t>8/6/2015</a:t>
             </a:fld>
             <a:endParaRPr lang="en-US" dirty="0"/>
           </a:p>
@@ -2196,7 +2279,7 @@
           <a:p>
             <a:fld id="{39995FF6-0FDD-4A80-96B8-72BF71AD8DFB}" type="datetimeFigureOut">
               <a:rPr lang="en-US" smtClean="0"/>
-              <a:t>8/4/2015</a:t>
+              <a:t>8/6/2015</a:t>
             </a:fld>
             <a:endParaRPr lang="en-US" dirty="0"/>
           </a:p>
@@ -2291,7 +2374,7 @@
           <a:p>
             <a:fld id="{39995FF6-0FDD-4A80-96B8-72BF71AD8DFB}" type="datetimeFigureOut">
               <a:rPr lang="en-US" smtClean="0"/>
-              <a:t>8/4/2015</a:t>
+              <a:t>8/6/2015</a:t>
             </a:fld>
             <a:endParaRPr lang="en-US" dirty="0"/>
           </a:p>
@@ -2568,7 +2651,7 @@
           <a:p>
             <a:fld id="{39995FF6-0FDD-4A80-96B8-72BF71AD8DFB}" type="datetimeFigureOut">
               <a:rPr lang="en-US" smtClean="0"/>
-              <a:t>8/4/2015</a:t>
+              <a:t>8/6/2015</a:t>
             </a:fld>
             <a:endParaRPr lang="en-US" dirty="0"/>
           </a:p>
@@ -2821,7 +2904,7 @@
           <a:p>
             <a:fld id="{39995FF6-0FDD-4A80-96B8-72BF71AD8DFB}" type="datetimeFigureOut">
               <a:rPr lang="en-US" smtClean="0"/>
-              <a:t>8/4/2015</a:t>
+              <a:t>8/6/2015</a:t>
             </a:fld>
             <a:endParaRPr lang="en-US" dirty="0"/>
           </a:p>
@@ -3034,7 +3117,7 @@
           <a:p>
             <a:fld id="{39995FF6-0FDD-4A80-96B8-72BF71AD8DFB}" type="datetimeFigureOut">
               <a:rPr lang="en-US" smtClean="0"/>
-              <a:t>8/4/2015</a:t>
+              <a:t>8/6/2015</a:t>
             </a:fld>
             <a:endParaRPr lang="en-US" dirty="0"/>
           </a:p>
@@ -3541,144 +3624,36 @@
           <a:p>
             <a:r>
               <a:rPr lang="en-US" dirty="0" smtClean="0"/>
-              <a:t>Simple Direct Exchange</a:t>
-            </a:r>
-            <a:endParaRPr lang="en-US" dirty="0"/>
-          </a:p>
-        </p:txBody>
-      </p:sp>
-      <p:sp>
-        <p:nvSpPr>
-          <p:cNvPr id="6" name="Oval 5"/>
-          <p:cNvSpPr/>
+              <a:t>Direct Message Pattern</a:t>
+            </a:r>
+            <a:endParaRPr lang="en-US" dirty="0"/>
+          </a:p>
+        </p:txBody>
+      </p:sp>
+      <p:pic>
+        <p:nvPicPr>
+          <p:cNvPr id="10" name="Picture 9"/>
+          <p:cNvPicPr>
+            <a:picLocks noChangeAspect="1"/>
+          </p:cNvPicPr>
           <p:nvPr/>
-        </p:nvSpPr>
+        </p:nvPicPr>
+        <p:blipFill>
+          <a:blip r:embed="rId2"/>
+          <a:stretch>
+            <a:fillRect/>
+          </a:stretch>
+        </p:blipFill>
         <p:spPr>
           <a:xfrm>
-            <a:off x="2772696" y="3145885"/>
-            <a:ext cx="2123767" cy="1878397"/>
+            <a:off x="1566723" y="2049710"/>
+            <a:ext cx="9046141" cy="3412836"/>
           </a:xfrm>
-          <a:prstGeom prst="ellipse">
+          <a:prstGeom prst="rect">
             <a:avLst/>
           </a:prstGeom>
         </p:spPr>
-        <p:style>
-          <a:lnRef idx="2">
-            <a:schemeClr val="accent1">
-              <a:shade val="50000"/>
-            </a:schemeClr>
-          </a:lnRef>
-          <a:fillRef idx="1">
-            <a:schemeClr val="accent1"/>
-          </a:fillRef>
-          <a:effectRef idx="0">
-            <a:schemeClr val="accent1"/>
-          </a:effectRef>
-          <a:fontRef idx="minor">
-            <a:schemeClr val="lt1"/>
-          </a:fontRef>
-        </p:style>
-        <p:txBody>
-          <a:bodyPr rtlCol="0" anchor="ctr"/>
-          <a:lstStyle/>
-          <a:p>
-            <a:pPr algn="ctr"/>
-            <a:r>
-              <a:rPr lang="en-US" dirty="0" smtClean="0"/>
-              <a:t>Exchange</a:t>
-            </a:r>
-            <a:endParaRPr lang="en-US" dirty="0"/>
-          </a:p>
-        </p:txBody>
-      </p:sp>
-      <p:sp>
-        <p:nvSpPr>
-          <p:cNvPr id="7" name="Right Arrow 6"/>
-          <p:cNvSpPr/>
-          <p:nvPr/>
-        </p:nvSpPr>
-        <p:spPr>
-          <a:xfrm>
-            <a:off x="5127523" y="3706542"/>
-            <a:ext cx="1720646" cy="776748"/>
-          </a:xfrm>
-          <a:prstGeom prst="rightArrow">
-            <a:avLst/>
-          </a:prstGeom>
-        </p:spPr>
-        <p:style>
-          <a:lnRef idx="2">
-            <a:schemeClr val="accent1">
-              <a:shade val="50000"/>
-            </a:schemeClr>
-          </a:lnRef>
-          <a:fillRef idx="1">
-            <a:schemeClr val="accent1"/>
-          </a:fillRef>
-          <a:effectRef idx="0">
-            <a:schemeClr val="accent1"/>
-          </a:effectRef>
-          <a:fontRef idx="minor">
-            <a:schemeClr val="lt1"/>
-          </a:fontRef>
-        </p:style>
-        <p:txBody>
-          <a:bodyPr rtlCol="0" anchor="ctr"/>
-          <a:lstStyle/>
-          <a:p>
-            <a:pPr algn="ctr"/>
-            <a:r>
-              <a:rPr lang="en-US" dirty="0" smtClean="0"/>
-              <a:t>Routing Key</a:t>
-            </a:r>
-            <a:endParaRPr lang="en-US" dirty="0"/>
-          </a:p>
-        </p:txBody>
-      </p:sp>
-      <p:sp>
-        <p:nvSpPr>
-          <p:cNvPr id="12" name="Oval 11"/>
-          <p:cNvSpPr/>
-          <p:nvPr/>
-        </p:nvSpPr>
-        <p:spPr>
-          <a:xfrm>
-            <a:off x="6941574" y="3145885"/>
-            <a:ext cx="2133600" cy="1887794"/>
-          </a:xfrm>
-          <a:prstGeom prst="ellipse">
-            <a:avLst/>
-          </a:prstGeom>
-        </p:spPr>
-        <p:style>
-          <a:lnRef idx="2">
-            <a:schemeClr val="accent1">
-              <a:shade val="50000"/>
-            </a:schemeClr>
-          </a:lnRef>
-          <a:fillRef idx="1">
-            <a:schemeClr val="accent1"/>
-          </a:fillRef>
-          <a:effectRef idx="0">
-            <a:schemeClr val="accent1"/>
-          </a:effectRef>
-          <a:fontRef idx="minor">
-            <a:schemeClr val="lt1"/>
-          </a:fontRef>
-        </p:style>
-        <p:txBody>
-          <a:bodyPr rtlCol="0" anchor="ctr"/>
-          <a:lstStyle/>
-          <a:p>
-            <a:pPr algn="ctr"/>
-            <a:r>
-              <a:rPr lang="en-US" dirty="0" smtClean="0"/>
-              <a:t>Queue</a:t>
-            </a:r>
-            <a:endParaRPr lang="en-US" dirty="0"/>
-          </a:p>
-        </p:txBody>
-      </p:sp>
+      </p:pic>
     </p:spTree>
     <p:extLst>
       <p:ext uri="{BB962C8B-B14F-4D97-AF65-F5344CB8AC3E}">
@@ -3733,228 +3708,49 @@
           <a:p>
             <a:r>
               <a:rPr lang="en-US" dirty="0" smtClean="0"/>
-              <a:t>Direct Exchange with Routing</a:t>
-            </a:r>
-            <a:endParaRPr lang="en-US" dirty="0"/>
-          </a:p>
-        </p:txBody>
-      </p:sp>
-      <p:sp>
-        <p:nvSpPr>
-          <p:cNvPr id="4" name="Oval 3"/>
-          <p:cNvSpPr/>
-          <p:nvPr/>
-        </p:nvSpPr>
-        <p:spPr>
-          <a:xfrm>
-            <a:off x="1772266" y="3126658"/>
-            <a:ext cx="2308122" cy="2084440"/>
-          </a:xfrm>
-          <a:prstGeom prst="ellipse">
-            <a:avLst/>
-          </a:prstGeom>
-        </p:spPr>
-        <p:style>
-          <a:lnRef idx="2">
-            <a:schemeClr val="accent1">
-              <a:shade val="50000"/>
-            </a:schemeClr>
-          </a:lnRef>
-          <a:fillRef idx="1">
-            <a:schemeClr val="accent1"/>
-          </a:fillRef>
-          <a:effectRef idx="0">
-            <a:schemeClr val="accent1"/>
-          </a:effectRef>
-          <a:fontRef idx="minor">
-            <a:schemeClr val="lt1"/>
-          </a:fontRef>
-        </p:style>
-        <p:txBody>
-          <a:bodyPr rtlCol="0" anchor="ctr"/>
-          <a:lstStyle/>
-          <a:p>
-            <a:pPr algn="ctr"/>
-            <a:r>
-              <a:rPr lang="en-US" dirty="0" smtClean="0"/>
-              <a:t>Vehicle Exchange</a:t>
-            </a:r>
-            <a:endParaRPr lang="en-US" dirty="0"/>
-          </a:p>
-        </p:txBody>
-      </p:sp>
-      <p:sp>
-        <p:nvSpPr>
-          <p:cNvPr id="5" name="Oval 4"/>
-          <p:cNvSpPr/>
-          <p:nvPr/>
-        </p:nvSpPr>
-        <p:spPr>
-          <a:xfrm>
-            <a:off x="6897329" y="1690688"/>
-            <a:ext cx="2084439" cy="1956620"/>
-          </a:xfrm>
-          <a:prstGeom prst="ellipse">
-            <a:avLst/>
-          </a:prstGeom>
-        </p:spPr>
-        <p:style>
-          <a:lnRef idx="2">
-            <a:schemeClr val="accent1">
-              <a:shade val="50000"/>
-            </a:schemeClr>
-          </a:lnRef>
-          <a:fillRef idx="1">
-            <a:schemeClr val="accent1"/>
-          </a:fillRef>
-          <a:effectRef idx="0">
-            <a:schemeClr val="accent1"/>
-          </a:effectRef>
-          <a:fontRef idx="minor">
-            <a:schemeClr val="lt1"/>
-          </a:fontRef>
-        </p:style>
-        <p:txBody>
-          <a:bodyPr rtlCol="0" anchor="ctr"/>
-          <a:lstStyle/>
-          <a:p>
-            <a:pPr algn="ctr"/>
-            <a:r>
-              <a:rPr lang="en-US" dirty="0" smtClean="0"/>
-              <a:t>Cars Queue</a:t>
-            </a:r>
-            <a:endParaRPr lang="en-US" dirty="0"/>
-          </a:p>
-        </p:txBody>
-      </p:sp>
-      <p:sp>
-        <p:nvSpPr>
-          <p:cNvPr id="6" name="Oval 5"/>
-          <p:cNvSpPr/>
-          <p:nvPr/>
-        </p:nvSpPr>
-        <p:spPr>
-          <a:xfrm>
-            <a:off x="6931742" y="4650658"/>
-            <a:ext cx="2015612" cy="1799303"/>
-          </a:xfrm>
-          <a:prstGeom prst="ellipse">
-            <a:avLst/>
-          </a:prstGeom>
-        </p:spPr>
-        <p:style>
-          <a:lnRef idx="2">
-            <a:schemeClr val="accent1">
-              <a:shade val="50000"/>
-            </a:schemeClr>
-          </a:lnRef>
-          <a:fillRef idx="1">
-            <a:schemeClr val="accent1"/>
-          </a:fillRef>
-          <a:effectRef idx="0">
-            <a:schemeClr val="accent1"/>
-          </a:effectRef>
-          <a:fontRef idx="minor">
-            <a:schemeClr val="lt1"/>
-          </a:fontRef>
-        </p:style>
-        <p:txBody>
-          <a:bodyPr rtlCol="0" anchor="ctr"/>
-          <a:lstStyle/>
-          <a:p>
-            <a:pPr algn="ctr"/>
-            <a:r>
-              <a:rPr lang="en-US" dirty="0" smtClean="0"/>
-              <a:t>Trucks Queue</a:t>
-            </a:r>
-            <a:endParaRPr lang="en-US" dirty="0"/>
-          </a:p>
-        </p:txBody>
-      </p:sp>
-      <p:sp>
-        <p:nvSpPr>
-          <p:cNvPr id="7" name="Right Arrow 6"/>
-          <p:cNvSpPr/>
-          <p:nvPr/>
-        </p:nvSpPr>
-        <p:spPr>
-          <a:xfrm rot="20560631">
-            <a:off x="4080388" y="3008671"/>
-            <a:ext cx="2816941" cy="638637"/>
-          </a:xfrm>
-          <a:prstGeom prst="rightArrow">
-            <a:avLst/>
-          </a:prstGeom>
-        </p:spPr>
-        <p:style>
-          <a:lnRef idx="2">
-            <a:schemeClr val="accent1">
-              <a:shade val="50000"/>
-            </a:schemeClr>
-          </a:lnRef>
-          <a:fillRef idx="1">
-            <a:schemeClr val="accent1"/>
-          </a:fillRef>
-          <a:effectRef idx="0">
-            <a:schemeClr val="accent1"/>
-          </a:effectRef>
-          <a:fontRef idx="minor">
-            <a:schemeClr val="lt1"/>
-          </a:fontRef>
-        </p:style>
-        <p:txBody>
-          <a:bodyPr rtlCol="0" anchor="ctr"/>
-          <a:lstStyle/>
-          <a:p>
-            <a:pPr algn="ctr"/>
-            <a:r>
-              <a:rPr lang="en-US" dirty="0" smtClean="0"/>
-              <a:t>Routing Key = cars</a:t>
-            </a:r>
-            <a:endParaRPr lang="en-US" dirty="0"/>
-          </a:p>
-        </p:txBody>
-      </p:sp>
-      <p:sp>
-        <p:nvSpPr>
-          <p:cNvPr id="8" name="Right Arrow 7"/>
-          <p:cNvSpPr/>
-          <p:nvPr/>
-        </p:nvSpPr>
-        <p:spPr>
-          <a:xfrm rot="987993">
-            <a:off x="4254910" y="4526617"/>
-            <a:ext cx="2467897" cy="570271"/>
-          </a:xfrm>
-          <a:prstGeom prst="rightArrow">
-            <a:avLst/>
-          </a:prstGeom>
-        </p:spPr>
-        <p:style>
-          <a:lnRef idx="2">
-            <a:schemeClr val="accent1">
-              <a:shade val="50000"/>
-            </a:schemeClr>
-          </a:lnRef>
-          <a:fillRef idx="1">
-            <a:schemeClr val="accent1"/>
-          </a:fillRef>
-          <a:effectRef idx="0">
-            <a:schemeClr val="accent1"/>
-          </a:effectRef>
-          <a:fontRef idx="minor">
-            <a:schemeClr val="lt1"/>
-          </a:fontRef>
-        </p:style>
-        <p:txBody>
-          <a:bodyPr rtlCol="0" anchor="ctr"/>
-          <a:lstStyle/>
-          <a:p>
-            <a:pPr algn="ctr"/>
-            <a:r>
-              <a:rPr lang="en-US" dirty="0" smtClean="0"/>
-              <a:t>Routing Key = trucks</a:t>
-            </a:r>
+              <a:t>Direct Demo</a:t>
+            </a:r>
+            <a:endParaRPr lang="en-US" dirty="0"/>
+          </a:p>
+        </p:txBody>
+      </p:sp>
+      <p:sp>
+        <p:nvSpPr>
+          <p:cNvPr id="3" name="Content Placeholder 2"/>
+          <p:cNvSpPr>
+            <a:spLocks noGrp="1"/>
+          </p:cNvSpPr>
+          <p:nvPr>
+            <p:ph idx="1"/>
+          </p:nvPr>
+        </p:nvSpPr>
+        <p:spPr/>
+        <p:txBody>
+          <a:bodyPr/>
+          <a:lstStyle/>
+          <a:p>
+            <a:r>
+              <a:rPr lang="en-US" dirty="0" smtClean="0"/>
+              <a:t>Demo No Routing Projects</a:t>
+            </a:r>
+          </a:p>
+          <a:p>
+            <a:pPr lvl="1"/>
+            <a:r>
+              <a:rPr lang="en-US" dirty="0" err="1" smtClean="0"/>
+              <a:t>NoRouteSender</a:t>
+            </a:r>
+            <a:endParaRPr lang="en-US" dirty="0"/>
+          </a:p>
+          <a:p>
+            <a:pPr lvl="1"/>
+            <a:r>
+              <a:rPr lang="en-US" dirty="0" err="1" smtClean="0"/>
+              <a:t>NoRouteHandler</a:t>
+            </a:r>
+            <a:endParaRPr lang="en-US" dirty="0"/>
+          </a:p>
+          <a:p>
             <a:endParaRPr lang="en-US" dirty="0"/>
           </a:p>
         </p:txBody>
@@ -3962,7 +3758,7 @@
     </p:spTree>
     <p:extLst>
       <p:ext uri="{BB962C8B-B14F-4D97-AF65-F5344CB8AC3E}">
-        <p14:creationId xmlns:p14="http://schemas.microsoft.com/office/powerpoint/2010/main" val="739021563"/>
+        <p14:creationId xmlns:p14="http://schemas.microsoft.com/office/powerpoint/2010/main" val="313882161"/>
       </p:ext>
     </p:extLst>
   </p:cSld>
@@ -4013,87 +3809,42 @@
           <a:p>
             <a:r>
               <a:rPr lang="en-US" dirty="0" smtClean="0"/>
-              <a:t>Direct Exchange Demo</a:t>
-            </a:r>
-            <a:endParaRPr lang="en-US" dirty="0"/>
-          </a:p>
-        </p:txBody>
-      </p:sp>
-      <p:sp>
-        <p:nvSpPr>
-          <p:cNvPr id="3" name="Content Placeholder 2"/>
-          <p:cNvSpPr>
-            <a:spLocks noGrp="1"/>
-          </p:cNvSpPr>
+              <a:t>The Scenario – Batch Process</a:t>
+            </a:r>
+            <a:endParaRPr lang="en-US" dirty="0"/>
+          </a:p>
+        </p:txBody>
+      </p:sp>
+      <p:pic>
+        <p:nvPicPr>
+          <p:cNvPr id="12" name="Content Placeholder 11"/>
+          <p:cNvPicPr>
+            <a:picLocks noGrp="1" noChangeAspect="1"/>
+          </p:cNvPicPr>
           <p:nvPr>
             <p:ph idx="1"/>
           </p:nvPr>
-        </p:nvSpPr>
-        <p:spPr/>
-        <p:txBody>
-          <a:bodyPr/>
-          <a:lstStyle/>
-          <a:p>
-            <a:r>
-              <a:rPr lang="en-US" dirty="0" smtClean="0"/>
-              <a:t>Demo No Routing Projects</a:t>
-            </a:r>
-          </a:p>
-          <a:p>
-            <a:pPr lvl="1"/>
-            <a:r>
-              <a:rPr lang="en-US" dirty="0" err="1" smtClean="0"/>
-              <a:t>NoRouteSender</a:t>
-            </a:r>
-            <a:endParaRPr lang="en-US" dirty="0"/>
-          </a:p>
-          <a:p>
-            <a:pPr lvl="1"/>
-            <a:r>
-              <a:rPr lang="en-US" dirty="0" err="1" smtClean="0"/>
-              <a:t>NoRouteHandler</a:t>
-            </a:r>
-            <a:endParaRPr lang="en-US" dirty="0"/>
-          </a:p>
-          <a:p>
-            <a:r>
-              <a:rPr lang="en-US" dirty="0" smtClean="0"/>
-              <a:t>Demo Routing Projects</a:t>
-            </a:r>
-          </a:p>
-          <a:p>
-            <a:pPr lvl="1"/>
-            <a:r>
-              <a:rPr lang="en-US" dirty="0" err="1" smtClean="0"/>
-              <a:t>RoutingSender</a:t>
-            </a:r>
-            <a:endParaRPr lang="en-US" dirty="0" smtClean="0"/>
-          </a:p>
-          <a:p>
-            <a:pPr lvl="1"/>
-            <a:r>
-              <a:rPr lang="en-US" dirty="0" err="1" smtClean="0"/>
-              <a:t>HandleCars</a:t>
-            </a:r>
-            <a:endParaRPr lang="en-US" dirty="0" smtClean="0"/>
-          </a:p>
-          <a:p>
-            <a:pPr lvl="1"/>
-            <a:r>
-              <a:rPr lang="en-US" dirty="0" err="1" smtClean="0"/>
-              <a:t>HandleTrucks</a:t>
-            </a:r>
-            <a:endParaRPr lang="en-US" dirty="0" smtClean="0"/>
-          </a:p>
-          <a:p>
-            <a:endParaRPr lang="en-US" dirty="0"/>
-          </a:p>
-        </p:txBody>
-      </p:sp>
+        </p:nvPicPr>
+        <p:blipFill>
+          <a:blip r:embed="rId2"/>
+          <a:stretch>
+            <a:fillRect/>
+          </a:stretch>
+        </p:blipFill>
+        <p:spPr>
+          <a:xfrm>
+            <a:off x="3228299" y="1690688"/>
+            <a:ext cx="3726334" cy="4958896"/>
+          </a:xfrm>
+          <a:prstGeom prst="rect">
+            <a:avLst/>
+          </a:prstGeom>
+        </p:spPr>
+      </p:pic>
     </p:spTree>
     <p:extLst>
       <p:ext uri="{BB962C8B-B14F-4D97-AF65-F5344CB8AC3E}">
-        <p14:creationId xmlns:p14="http://schemas.microsoft.com/office/powerpoint/2010/main" val="313882161"/>
+        <p14:creationId xmlns:p14="http://schemas.microsoft.com/office/powerpoint/2010/main" val="522960924"/>
       </p:ext>
     </p:extLst>
   </p:cSld>
@@ -4144,7 +3895,7 @@
           <a:p>
             <a:r>
               <a:rPr lang="en-US" dirty="0" smtClean="0"/>
-              <a:t>Fanout Exchange</a:t>
+              <a:t>Problems</a:t>
             </a:r>
             <a:endParaRPr lang="en-US" dirty="0"/>
           </a:p>
@@ -4162,32 +3913,60 @@
         </p:nvSpPr>
         <p:spPr/>
         <p:txBody>
-          <a:bodyPr/>
-          <a:lstStyle/>
-          <a:p>
-            <a:r>
-              <a:rPr lang="en-US" dirty="0" smtClean="0"/>
-              <a:t>Sends a copy of the message to all bound queues</a:t>
-            </a:r>
-          </a:p>
-          <a:p>
-            <a:r>
-              <a:rPr lang="en-US" dirty="0" smtClean="0"/>
-              <a:t>No Routing</a:t>
-            </a:r>
-          </a:p>
-          <a:p>
-            <a:r>
-              <a:rPr lang="en-US" dirty="0" smtClean="0"/>
-              <a:t>Most commonly used with Publish/Subscribe</a:t>
-            </a:r>
+          <a:bodyPr>
+            <a:normAutofit/>
+          </a:bodyPr>
+          <a:lstStyle/>
+          <a:p>
+            <a:r>
+              <a:rPr lang="en-US" dirty="0" smtClean="0"/>
+              <a:t>The IsProcessed field means nothing to the data after set to true</a:t>
+            </a:r>
+          </a:p>
+          <a:p>
+            <a:r>
+              <a:rPr lang="en-US" dirty="0" smtClean="0"/>
+              <a:t>The larger the table gets, the more data you need to query over</a:t>
+            </a:r>
+          </a:p>
+          <a:p>
+            <a:r>
+              <a:rPr lang="en-US" dirty="0" smtClean="0"/>
+              <a:t>New Data isn’t available until the job runs.</a:t>
+            </a:r>
+          </a:p>
+          <a:p>
+            <a:r>
+              <a:rPr lang="en-US" dirty="0" smtClean="0"/>
+              <a:t>Failures </a:t>
+            </a:r>
+            <a:r>
+              <a:rPr lang="en-US" dirty="0"/>
+              <a:t>lead to longer delays</a:t>
+            </a:r>
+            <a:r>
+              <a:rPr lang="en-US" dirty="0" smtClean="0"/>
+              <a:t>.</a:t>
+            </a:r>
+          </a:p>
+          <a:p>
+            <a:r>
+              <a:rPr lang="en-US" dirty="0"/>
+              <a:t>Product Owner, decides there is another process we want to run on the original data.  Add another flag and batch job?</a:t>
+            </a:r>
+          </a:p>
+          <a:p>
+            <a:endParaRPr lang="en-US" dirty="0"/>
+          </a:p>
+          <a:p>
+            <a:endParaRPr lang="en-US" dirty="0" smtClean="0"/>
           </a:p>
         </p:txBody>
       </p:sp>
     </p:spTree>
     <p:extLst>
       <p:ext uri="{BB962C8B-B14F-4D97-AF65-F5344CB8AC3E}">
-        <p14:creationId xmlns:p14="http://schemas.microsoft.com/office/powerpoint/2010/main" val="1180348854"/>
+        <p14:creationId xmlns:p14="http://schemas.microsoft.com/office/powerpoint/2010/main" val="699181284"/>
       </p:ext>
     </p:extLst>
   </p:cSld>
@@ -4238,236 +4017,42 @@
           <a:p>
             <a:r>
               <a:rPr lang="en-US" dirty="0" smtClean="0"/>
-              <a:t>Fanout Diagram</a:t>
-            </a:r>
-            <a:endParaRPr lang="en-US" dirty="0"/>
-          </a:p>
-        </p:txBody>
-      </p:sp>
-      <p:sp>
-        <p:nvSpPr>
-          <p:cNvPr id="5" name="Oval 4"/>
-          <p:cNvSpPr/>
-          <p:nvPr/>
-        </p:nvSpPr>
+              <a:t>Potential Solution</a:t>
+            </a:r>
+            <a:endParaRPr lang="en-US" dirty="0"/>
+          </a:p>
+        </p:txBody>
+      </p:sp>
+      <p:pic>
+        <p:nvPicPr>
+          <p:cNvPr id="11" name="Content Placeholder 10"/>
+          <p:cNvPicPr>
+            <a:picLocks noGrp="1" noChangeAspect="1"/>
+          </p:cNvPicPr>
+          <p:nvPr>
+            <p:ph idx="1"/>
+          </p:nvPr>
+        </p:nvPicPr>
+        <p:blipFill>
+          <a:blip r:embed="rId2"/>
+          <a:stretch>
+            <a:fillRect/>
+          </a:stretch>
+        </p:blipFill>
         <p:spPr>
           <a:xfrm>
-            <a:off x="2015613" y="2871020"/>
-            <a:ext cx="1966452" cy="1956619"/>
+            <a:off x="3873646" y="1466397"/>
+            <a:ext cx="3049668" cy="5270246"/>
           </a:xfrm>
-          <a:prstGeom prst="ellipse">
+          <a:prstGeom prst="rect">
             <a:avLst/>
           </a:prstGeom>
         </p:spPr>
-        <p:style>
-          <a:lnRef idx="2">
-            <a:schemeClr val="accent1">
-              <a:shade val="50000"/>
-            </a:schemeClr>
-          </a:lnRef>
-          <a:fillRef idx="1">
-            <a:schemeClr val="accent1"/>
-          </a:fillRef>
-          <a:effectRef idx="0">
-            <a:schemeClr val="accent1"/>
-          </a:effectRef>
-          <a:fontRef idx="minor">
-            <a:schemeClr val="lt1"/>
-          </a:fontRef>
-        </p:style>
-        <p:txBody>
-          <a:bodyPr rtlCol="0" anchor="ctr"/>
-          <a:lstStyle/>
-          <a:p>
-            <a:pPr algn="ctr"/>
-            <a:r>
-              <a:rPr lang="en-US" dirty="0" smtClean="0"/>
-              <a:t>Alert Exchange</a:t>
-            </a:r>
-            <a:endParaRPr lang="en-US" dirty="0"/>
-          </a:p>
-        </p:txBody>
-      </p:sp>
-      <p:sp>
-        <p:nvSpPr>
-          <p:cNvPr id="6" name="Oval 5"/>
-          <p:cNvSpPr/>
-          <p:nvPr/>
-        </p:nvSpPr>
-        <p:spPr>
-          <a:xfrm>
-            <a:off x="6435213" y="1690688"/>
-            <a:ext cx="1966452" cy="1956619"/>
-          </a:xfrm>
-          <a:prstGeom prst="ellipse">
-            <a:avLst/>
-          </a:prstGeom>
-        </p:spPr>
-        <p:style>
-          <a:lnRef idx="2">
-            <a:schemeClr val="accent1">
-              <a:shade val="50000"/>
-            </a:schemeClr>
-          </a:lnRef>
-          <a:fillRef idx="1">
-            <a:schemeClr val="accent1"/>
-          </a:fillRef>
-          <a:effectRef idx="0">
-            <a:schemeClr val="accent1"/>
-          </a:effectRef>
-          <a:fontRef idx="minor">
-            <a:schemeClr val="lt1"/>
-          </a:fontRef>
-        </p:style>
-        <p:txBody>
-          <a:bodyPr rtlCol="0" anchor="ctr"/>
-          <a:lstStyle/>
-          <a:p>
-            <a:pPr algn="ctr"/>
-            <a:r>
-              <a:rPr lang="en-US" dirty="0" smtClean="0"/>
-              <a:t>Alert Email Queue</a:t>
-            </a:r>
-            <a:endParaRPr lang="en-US" dirty="0"/>
-          </a:p>
-        </p:txBody>
-      </p:sp>
-      <p:sp>
-        <p:nvSpPr>
-          <p:cNvPr id="7" name="Oval 6"/>
-          <p:cNvSpPr/>
-          <p:nvPr/>
-        </p:nvSpPr>
-        <p:spPr>
-          <a:xfrm>
-            <a:off x="6435213" y="3849329"/>
-            <a:ext cx="1966452" cy="1956619"/>
-          </a:xfrm>
-          <a:prstGeom prst="ellipse">
-            <a:avLst/>
-          </a:prstGeom>
-        </p:spPr>
-        <p:style>
-          <a:lnRef idx="2">
-            <a:schemeClr val="accent1">
-              <a:shade val="50000"/>
-            </a:schemeClr>
-          </a:lnRef>
-          <a:fillRef idx="1">
-            <a:schemeClr val="accent1"/>
-          </a:fillRef>
-          <a:effectRef idx="0">
-            <a:schemeClr val="accent1"/>
-          </a:effectRef>
-          <a:fontRef idx="minor">
-            <a:schemeClr val="lt1"/>
-          </a:fontRef>
-        </p:style>
-        <p:txBody>
-          <a:bodyPr rtlCol="0" anchor="ctr"/>
-          <a:lstStyle/>
-          <a:p>
-            <a:pPr algn="ctr"/>
-            <a:r>
-              <a:rPr lang="en-US" dirty="0" smtClean="0"/>
-              <a:t>Alert Logging Queue</a:t>
-            </a:r>
-            <a:endParaRPr lang="en-US" dirty="0"/>
-          </a:p>
-        </p:txBody>
-      </p:sp>
-      <p:sp>
-        <p:nvSpPr>
-          <p:cNvPr id="8" name="Right Arrow 7"/>
-          <p:cNvSpPr/>
-          <p:nvPr/>
-        </p:nvSpPr>
-        <p:spPr>
-          <a:xfrm rot="21031254">
-            <a:off x="4217027" y="2952967"/>
-            <a:ext cx="2045110" cy="732964"/>
-          </a:xfrm>
-          <a:prstGeom prst="rightArrow">
-            <a:avLst/>
-          </a:prstGeom>
-        </p:spPr>
-        <p:style>
-          <a:lnRef idx="2">
-            <a:schemeClr val="accent1">
-              <a:shade val="50000"/>
-            </a:schemeClr>
-          </a:lnRef>
-          <a:fillRef idx="1">
-            <a:schemeClr val="accent1"/>
-          </a:fillRef>
-          <a:effectRef idx="0">
-            <a:schemeClr val="accent1"/>
-          </a:effectRef>
-          <a:fontRef idx="minor">
-            <a:schemeClr val="lt1"/>
-          </a:fontRef>
-        </p:style>
-        <p:txBody>
-          <a:bodyPr rtlCol="0" anchor="ctr"/>
-          <a:lstStyle/>
-          <a:p>
-            <a:pPr algn="ctr"/>
-            <a:r>
-              <a:rPr lang="en-US" dirty="0" smtClean="0"/>
-              <a:t>Alert Message</a:t>
-            </a:r>
-            <a:endParaRPr lang="en-US" dirty="0"/>
-          </a:p>
-        </p:txBody>
-      </p:sp>
-      <p:sp>
-        <p:nvSpPr>
-          <p:cNvPr id="9" name="Right Arrow 8"/>
-          <p:cNvSpPr/>
-          <p:nvPr/>
-        </p:nvSpPr>
-        <p:spPr>
-          <a:xfrm rot="753318">
-            <a:off x="4208206" y="3765294"/>
-            <a:ext cx="2045110" cy="732964"/>
-          </a:xfrm>
-          <a:prstGeom prst="rightArrow">
-            <a:avLst/>
-          </a:prstGeom>
-        </p:spPr>
-        <p:style>
-          <a:lnRef idx="2">
-            <a:schemeClr val="accent1">
-              <a:shade val="50000"/>
-            </a:schemeClr>
-          </a:lnRef>
-          <a:fillRef idx="1">
-            <a:schemeClr val="accent1"/>
-          </a:fillRef>
-          <a:effectRef idx="0">
-            <a:schemeClr val="accent1"/>
-          </a:effectRef>
-          <a:fontRef idx="minor">
-            <a:schemeClr val="lt1"/>
-          </a:fontRef>
-        </p:style>
-        <p:txBody>
-          <a:bodyPr rtlCol="0" anchor="ctr"/>
-          <a:lstStyle/>
-          <a:p>
-            <a:pPr algn="ctr"/>
-            <a:r>
-              <a:rPr lang="en-US" dirty="0" smtClean="0"/>
-              <a:t>Alert Message</a:t>
-            </a:r>
-            <a:endParaRPr lang="en-US" dirty="0"/>
-          </a:p>
-        </p:txBody>
-      </p:sp>
+      </p:pic>
     </p:spTree>
     <p:extLst>
       <p:ext uri="{BB962C8B-B14F-4D97-AF65-F5344CB8AC3E}">
-        <p14:creationId xmlns:p14="http://schemas.microsoft.com/office/powerpoint/2010/main" val="2882274549"/>
+        <p14:creationId xmlns:p14="http://schemas.microsoft.com/office/powerpoint/2010/main" val="2726150810"/>
       </p:ext>
     </p:extLst>
   </p:cSld>
@@ -4517,8 +4102,12 @@
           <a:lstStyle/>
           <a:p>
             <a:r>
-              <a:rPr lang="en-US" dirty="0" smtClean="0"/>
-              <a:t>Fanout Exchange Demo</a:t>
+              <a:rPr lang="en-US" dirty="0" err="1" smtClean="0"/>
+              <a:t>Fanout</a:t>
+            </a:r>
+            <a:r>
+              <a:rPr lang="en-US" dirty="0" smtClean="0"/>
+              <a:t> Message Pattern</a:t>
             </a:r>
             <a:endParaRPr lang="en-US" dirty="0"/>
           </a:p>
@@ -4541,39 +4130,41 @@
           <a:p>
             <a:r>
               <a:rPr lang="en-US" dirty="0" smtClean="0"/>
-              <a:t>Demo Projects</a:t>
-            </a:r>
-          </a:p>
-          <a:p>
-            <a:pPr lvl="1"/>
-            <a:r>
-              <a:rPr lang="en-US" dirty="0" err="1" smtClean="0"/>
-              <a:t>SendAlert</a:t>
-            </a:r>
-            <a:endParaRPr lang="en-US" dirty="0" smtClean="0"/>
-          </a:p>
-          <a:p>
-            <a:pPr lvl="1"/>
-            <a:r>
-              <a:rPr lang="en-US" dirty="0" err="1" smtClean="0"/>
-              <a:t>EmailAlert</a:t>
-            </a:r>
-            <a:endParaRPr lang="en-US" dirty="0" smtClean="0"/>
-          </a:p>
-          <a:p>
-            <a:pPr lvl="1"/>
-            <a:r>
-              <a:rPr lang="en-US" dirty="0" err="1" smtClean="0"/>
-              <a:t>LogAlert</a:t>
-            </a:r>
-            <a:endParaRPr lang="en-US" dirty="0"/>
+              <a:t>Sends a copy of the message to multiple queues</a:t>
+            </a:r>
+          </a:p>
+          <a:p>
+            <a:r>
+              <a:rPr lang="en-US" dirty="0" smtClean="0"/>
+              <a:t>Each queue has a different purpose or subsystem</a:t>
+            </a:r>
+          </a:p>
+          <a:p>
+            <a:r>
+              <a:rPr lang="en-US" dirty="0" smtClean="0"/>
+              <a:t>Usually associated with an </a:t>
+            </a:r>
+            <a:r>
+              <a:rPr lang="en-US" dirty="0" smtClean="0"/>
+              <a:t>Event </a:t>
+            </a:r>
+            <a:r>
+              <a:rPr lang="en-US" dirty="0" smtClean="0"/>
+              <a:t>message</a:t>
+            </a:r>
+          </a:p>
+          <a:p>
+            <a:r>
+              <a:rPr lang="en-US" dirty="0" smtClean="0"/>
+              <a:t>Handlers for each queue can be scaled</a:t>
+            </a:r>
           </a:p>
         </p:txBody>
       </p:sp>
     </p:spTree>
     <p:extLst>
       <p:ext uri="{BB962C8B-B14F-4D97-AF65-F5344CB8AC3E}">
-        <p14:creationId xmlns:p14="http://schemas.microsoft.com/office/powerpoint/2010/main" val="2186821937"/>
+        <p14:creationId xmlns:p14="http://schemas.microsoft.com/office/powerpoint/2010/main" val="1180348854"/>
       </p:ext>
     </p:extLst>
   </p:cSld>
@@ -4623,8 +4214,12 @@
           <a:lstStyle/>
           <a:p>
             <a:r>
-              <a:rPr lang="en-US" dirty="0" smtClean="0"/>
-              <a:t>Topic Exchange</a:t>
+              <a:rPr lang="en-US" dirty="0" err="1" smtClean="0"/>
+              <a:t>Fanout</a:t>
+            </a:r>
+            <a:r>
+              <a:rPr lang="en-US" dirty="0" smtClean="0"/>
+              <a:t> Message Pattern</a:t>
             </a:r>
             <a:endParaRPr lang="en-US" dirty="0"/>
           </a:p>
@@ -4647,38 +4242,48 @@
           <a:p>
             <a:r>
               <a:rPr lang="en-US" dirty="0" smtClean="0"/>
-              <a:t>Similar to Routing with Direct Exchange</a:t>
-            </a:r>
-          </a:p>
-          <a:p>
-            <a:r>
-              <a:rPr lang="en-US" dirty="0" smtClean="0"/>
-              <a:t>Based on pattern matching in the routing key</a:t>
+              <a:t>Not in MSMQ (that I know of)</a:t>
+            </a:r>
+          </a:p>
+          <a:p>
+            <a:r>
+              <a:rPr lang="en-US" dirty="0" smtClean="0"/>
+              <a:t>Azure </a:t>
             </a:r>
           </a:p>
           <a:p>
             <a:pPr lvl="1"/>
             <a:r>
               <a:rPr lang="en-US" dirty="0" smtClean="0"/>
-              <a:t>* to replace 1 word</a:t>
+              <a:t>Send to Topic not Exchange</a:t>
             </a:r>
           </a:p>
           <a:p>
             <a:pPr lvl="1"/>
             <a:r>
               <a:rPr lang="en-US" dirty="0" smtClean="0"/>
-              <a:t># to replace 0 or more words</a:t>
-            </a:r>
-            <a:endParaRPr lang="en-US" b="1" dirty="0" smtClean="0">
-              <a:solidFill>
-                <a:srgbClr val="FF0000"/>
-              </a:solidFill>
-            </a:endParaRPr>
-          </a:p>
-          <a:p>
-            <a:r>
-              <a:rPr lang="en-US" dirty="0" smtClean="0"/>
-              <a:t>Also used in Publish/Subscribe models where only those that care receive it instead of everybody</a:t>
+              <a:t>Subscription is essentially the Queue</a:t>
+            </a:r>
+          </a:p>
+          <a:p>
+            <a:r>
+              <a:rPr lang="en-US" dirty="0" err="1" smtClean="0"/>
+              <a:t>RabbitMQ</a:t>
+            </a:r>
+            <a:endParaRPr lang="en-US" dirty="0" smtClean="0"/>
+          </a:p>
+          <a:p>
+            <a:pPr lvl="1"/>
+            <a:r>
+              <a:rPr lang="en-US" dirty="0" smtClean="0"/>
+              <a:t>Send to Exchange</a:t>
+            </a:r>
+          </a:p>
+          <a:p>
+            <a:pPr lvl="1"/>
+            <a:r>
+              <a:rPr lang="en-US" dirty="0" smtClean="0"/>
+              <a:t>Queue is a Queue</a:t>
             </a:r>
           </a:p>
         </p:txBody>
@@ -4686,7 +4291,7 @@
     </p:spTree>
     <p:extLst>
       <p:ext uri="{BB962C8B-B14F-4D97-AF65-F5344CB8AC3E}">
-        <p14:creationId xmlns:p14="http://schemas.microsoft.com/office/powerpoint/2010/main" val="3339925523"/>
+        <p14:creationId xmlns:p14="http://schemas.microsoft.com/office/powerpoint/2010/main" val="3658195184"/>
       </p:ext>
     </p:extLst>
   </p:cSld>
@@ -4737,111 +4342,40 @@
           <a:p>
             <a:r>
               <a:rPr lang="en-US" dirty="0" smtClean="0"/>
-              <a:t>Topic Exchange Example</a:t>
-            </a:r>
-            <a:endParaRPr lang="en-US" dirty="0"/>
-          </a:p>
-        </p:txBody>
-      </p:sp>
-      <p:sp>
-        <p:nvSpPr>
-          <p:cNvPr id="3" name="Content Placeholder 2"/>
-          <p:cNvSpPr>
-            <a:spLocks noGrp="1"/>
-          </p:cNvSpPr>
-          <p:nvPr>
-            <p:ph idx="1"/>
-          </p:nvPr>
-        </p:nvSpPr>
-        <p:spPr/>
-        <p:txBody>
-          <a:bodyPr/>
-          <a:lstStyle/>
-          <a:p>
-            <a:r>
-              <a:rPr lang="en-US" dirty="0" smtClean="0"/>
-              <a:t>A Queue with pattern #sales# Means any routing key with “sales” in it will be sent there.</a:t>
-            </a:r>
-          </a:p>
-          <a:p>
-            <a:pPr lvl="1"/>
-            <a:r>
-              <a:rPr lang="en-US" dirty="0" smtClean="0"/>
-              <a:t>Sales</a:t>
-            </a:r>
-          </a:p>
-          <a:p>
-            <a:pPr lvl="1"/>
-            <a:r>
-              <a:rPr lang="en-US" dirty="0" err="1"/>
-              <a:t>d</a:t>
-            </a:r>
-            <a:r>
-              <a:rPr lang="en-US" dirty="0" err="1" smtClean="0"/>
-              <a:t>iscount.sales</a:t>
-            </a:r>
-            <a:endParaRPr lang="en-US" dirty="0" smtClean="0"/>
-          </a:p>
-          <a:p>
-            <a:pPr lvl="1"/>
-            <a:r>
-              <a:rPr lang="en-US" dirty="0" err="1"/>
-              <a:t>c</a:t>
-            </a:r>
-            <a:r>
-              <a:rPr lang="en-US" dirty="0" err="1" smtClean="0"/>
-              <a:t>hristmas.sales.rushdelivery</a:t>
-            </a:r>
-            <a:endParaRPr lang="en-US" dirty="0" smtClean="0"/>
-          </a:p>
-          <a:p>
-            <a:r>
-              <a:rPr lang="en-US" dirty="0" smtClean="0"/>
-              <a:t>A queue with pattern discount# means any routing key that starts </a:t>
-            </a:r>
-            <a:r>
-              <a:rPr lang="en-US" smtClean="0"/>
-              <a:t>with discount</a:t>
-            </a:r>
-            <a:endParaRPr lang="en-US" dirty="0" smtClean="0"/>
-          </a:p>
-          <a:p>
-            <a:pPr lvl="1"/>
-            <a:r>
-              <a:rPr lang="en-US" dirty="0" smtClean="0"/>
-              <a:t>discount</a:t>
-            </a:r>
-          </a:p>
-          <a:p>
-            <a:pPr lvl="1"/>
-            <a:r>
-              <a:rPr lang="en-US" dirty="0" err="1"/>
-              <a:t>d</a:t>
-            </a:r>
-            <a:r>
-              <a:rPr lang="en-US" dirty="0" err="1" smtClean="0"/>
-              <a:t>iscount.return</a:t>
-            </a:r>
-            <a:endParaRPr lang="en-US" dirty="0" smtClean="0"/>
-          </a:p>
-          <a:p>
-            <a:pPr lvl="1"/>
-            <a:r>
-              <a:rPr lang="en-US" dirty="0" err="1"/>
-              <a:t>d</a:t>
-            </a:r>
-            <a:r>
-              <a:rPr lang="en-US" dirty="0" err="1" smtClean="0"/>
-              <a:t>iscount.sales.rushdelivery</a:t>
-            </a:r>
-            <a:endParaRPr lang="en-US" dirty="0"/>
-          </a:p>
-        </p:txBody>
-      </p:sp>
+              <a:t>Fanout Diagram</a:t>
+            </a:r>
+            <a:endParaRPr lang="en-US" dirty="0"/>
+          </a:p>
+        </p:txBody>
+      </p:sp>
+      <p:pic>
+        <p:nvPicPr>
+          <p:cNvPr id="3" name="Picture 2"/>
+          <p:cNvPicPr>
+            <a:picLocks noChangeAspect="1"/>
+          </p:cNvPicPr>
+          <p:nvPr/>
+        </p:nvPicPr>
+        <p:blipFill>
+          <a:blip r:embed="rId2"/>
+          <a:stretch>
+            <a:fillRect/>
+          </a:stretch>
+        </p:blipFill>
+        <p:spPr>
+          <a:xfrm>
+            <a:off x="1326469" y="1690688"/>
+            <a:ext cx="7833433" cy="4964245"/>
+          </a:xfrm>
+          <a:prstGeom prst="rect">
+            <a:avLst/>
+          </a:prstGeom>
+        </p:spPr>
+      </p:pic>
     </p:spTree>
     <p:extLst>
       <p:ext uri="{BB962C8B-B14F-4D97-AF65-F5344CB8AC3E}">
-        <p14:creationId xmlns:p14="http://schemas.microsoft.com/office/powerpoint/2010/main" val="106219468"/>
+        <p14:creationId xmlns:p14="http://schemas.microsoft.com/office/powerpoint/2010/main" val="2882274549"/>
       </p:ext>
     </p:extLst>
   </p:cSld>
@@ -4892,7 +4426,7 @@
           <a:p>
             <a:r>
               <a:rPr lang="en-US" dirty="0" smtClean="0"/>
-              <a:t>Topic Exchange Demo</a:t>
+              <a:t>Fanout Exchange Demo</a:t>
             </a:r>
             <a:endParaRPr lang="en-US" dirty="0"/>
           </a:p>
@@ -4915,14 +4449,14 @@
           <a:p>
             <a:r>
               <a:rPr lang="en-US" dirty="0" smtClean="0"/>
-              <a:t>Projects for Demo</a:t>
+              <a:t>Demo Projects</a:t>
             </a:r>
           </a:p>
           <a:p>
             <a:pPr lvl="1"/>
             <a:r>
               <a:rPr lang="en-US" dirty="0" err="1" smtClean="0"/>
-              <a:t>SendStoreTransaction</a:t>
+              <a:t>SendAlert</a:t>
             </a:r>
             <a:endParaRPr lang="en-US" dirty="0" smtClean="0"/>
           </a:p>
@@ -4930,7 +4464,7 @@
             <a:pPr lvl="1"/>
             <a:r>
               <a:rPr lang="en-US" dirty="0" err="1" smtClean="0"/>
-              <a:t>HandleSales</a:t>
+              <a:t>EmailAlert</a:t>
             </a:r>
             <a:endParaRPr lang="en-US" dirty="0" smtClean="0"/>
           </a:p>
@@ -4938,7 +4472,7 @@
             <a:pPr lvl="1"/>
             <a:r>
               <a:rPr lang="en-US" dirty="0" err="1" smtClean="0"/>
-              <a:t>HandleDiscounts</a:t>
+              <a:t>LogAlert</a:t>
             </a:r>
             <a:endParaRPr lang="en-US" dirty="0"/>
           </a:p>
@@ -4947,7 +4481,7 @@
     </p:spTree>
     <p:extLst>
       <p:ext uri="{BB962C8B-B14F-4D97-AF65-F5344CB8AC3E}">
-        <p14:creationId xmlns:p14="http://schemas.microsoft.com/office/powerpoint/2010/main" val="4291942589"/>
+        <p14:creationId xmlns:p14="http://schemas.microsoft.com/office/powerpoint/2010/main" val="2186821937"/>
       </p:ext>
     </p:extLst>
   </p:cSld>
@@ -4998,69 +4532,42 @@
           <a:p>
             <a:r>
               <a:rPr lang="en-US" dirty="0" smtClean="0"/>
-              <a:t>Headers Exchange</a:t>
-            </a:r>
-            <a:endParaRPr lang="en-US" dirty="0"/>
-          </a:p>
-        </p:txBody>
-      </p:sp>
-      <p:sp>
-        <p:nvSpPr>
-          <p:cNvPr id="3" name="Content Placeholder 2"/>
-          <p:cNvSpPr>
-            <a:spLocks noGrp="1"/>
-          </p:cNvSpPr>
+              <a:t>The Scenario – Blocking Process</a:t>
+            </a:r>
+            <a:endParaRPr lang="en-US" dirty="0"/>
+          </a:p>
+        </p:txBody>
+      </p:sp>
+      <p:pic>
+        <p:nvPicPr>
+          <p:cNvPr id="4" name="Content Placeholder 3"/>
+          <p:cNvPicPr>
+            <a:picLocks noGrp="1" noChangeAspect="1"/>
+          </p:cNvPicPr>
           <p:nvPr>
             <p:ph idx="1"/>
           </p:nvPr>
-        </p:nvSpPr>
-        <p:spPr/>
-        <p:txBody>
-          <a:bodyPr/>
-          <a:lstStyle/>
-          <a:p>
-            <a:r>
-              <a:rPr lang="en-US" dirty="0" smtClean="0"/>
-              <a:t>Routing mechanism based on multiple attributes</a:t>
-            </a:r>
-          </a:p>
-          <a:p>
-            <a:r>
-              <a:rPr lang="en-US" dirty="0" smtClean="0"/>
-              <a:t>Doesn’t need to be string based</a:t>
-            </a:r>
-          </a:p>
-          <a:p>
-            <a:r>
-              <a:rPr lang="en-US" dirty="0" smtClean="0"/>
-              <a:t>Can use special headers</a:t>
-            </a:r>
-          </a:p>
-          <a:p>
-            <a:pPr lvl="1"/>
-            <a:r>
-              <a:rPr lang="en-US" dirty="0"/>
-              <a:t>x</a:t>
-            </a:r>
-            <a:r>
-              <a:rPr lang="en-US" dirty="0" smtClean="0"/>
-              <a:t>-match = all</a:t>
-            </a:r>
-          </a:p>
-          <a:p>
-            <a:pPr lvl="1"/>
-            <a:r>
-              <a:rPr lang="en-US" dirty="0" smtClean="0"/>
-              <a:t>X-match = any</a:t>
-            </a:r>
-            <a:endParaRPr lang="en-US" dirty="0"/>
-          </a:p>
-        </p:txBody>
-      </p:sp>
+        </p:nvPicPr>
+        <p:blipFill>
+          <a:blip r:embed="rId2"/>
+          <a:stretch>
+            <a:fillRect/>
+          </a:stretch>
+        </p:blipFill>
+        <p:spPr>
+          <a:xfrm>
+            <a:off x="3060020" y="1841953"/>
+            <a:ext cx="5484131" cy="4351338"/>
+          </a:xfrm>
+          <a:prstGeom prst="rect">
+            <a:avLst/>
+          </a:prstGeom>
+        </p:spPr>
+      </p:pic>
     </p:spTree>
     <p:extLst>
       <p:ext uri="{BB962C8B-B14F-4D97-AF65-F5344CB8AC3E}">
-        <p14:creationId xmlns:p14="http://schemas.microsoft.com/office/powerpoint/2010/main" val="1366577133"/>
+        <p14:creationId xmlns:p14="http://schemas.microsoft.com/office/powerpoint/2010/main" val="3335941667"/>
       </p:ext>
     </p:extLst>
   </p:cSld>
@@ -5078,6 +4585,1167 @@
 </file>
 
 <file path=ppt/slides/slide2.xml><?xml version="1.0" encoding="utf-8"?>
+<p:sld xmlns:a="http://schemas.openxmlformats.org/drawingml/2006/main" xmlns:r="http://schemas.openxmlformats.org/officeDocument/2006/relationships" xmlns:p="http://schemas.openxmlformats.org/presentationml/2006/main">
+  <p:cSld>
+    <p:spTree>
+      <p:nvGrpSpPr>
+        <p:cNvPr id="1" name=""/>
+        <p:cNvGrpSpPr/>
+        <p:nvPr/>
+      </p:nvGrpSpPr>
+      <p:grpSpPr>
+        <a:xfrm>
+          <a:off x="0" y="0"/>
+          <a:ext cx="0" cy="0"/>
+          <a:chOff x="0" y="0"/>
+          <a:chExt cx="0" cy="0"/>
+        </a:xfrm>
+      </p:grpSpPr>
+      <p:sp>
+        <p:nvSpPr>
+          <p:cNvPr id="2" name="Title 1"/>
+          <p:cNvSpPr>
+            <a:spLocks noGrp="1"/>
+          </p:cNvSpPr>
+          <p:nvPr>
+            <p:ph type="title"/>
+          </p:nvPr>
+        </p:nvSpPr>
+        <p:spPr/>
+        <p:txBody>
+          <a:bodyPr/>
+          <a:lstStyle/>
+          <a:p>
+            <a:r>
+              <a:rPr lang="en-US" dirty="0" smtClean="0"/>
+              <a:t>Al Zaudtke</a:t>
+            </a:r>
+            <a:endParaRPr lang="en-US" dirty="0"/>
+          </a:p>
+        </p:txBody>
+      </p:sp>
+      <p:sp>
+        <p:nvSpPr>
+          <p:cNvPr id="3" name="Content Placeholder 2"/>
+          <p:cNvSpPr>
+            <a:spLocks noGrp="1"/>
+          </p:cNvSpPr>
+          <p:nvPr>
+            <p:ph idx="1"/>
+          </p:nvPr>
+        </p:nvSpPr>
+        <p:spPr/>
+        <p:txBody>
+          <a:bodyPr/>
+          <a:lstStyle/>
+          <a:p>
+            <a:r>
+              <a:rPr lang="en-US" dirty="0" smtClean="0"/>
+              <a:t>Architect at J. J. Keller &amp; Associates, Inc.</a:t>
+            </a:r>
+          </a:p>
+          <a:p>
+            <a:r>
+              <a:rPr lang="en-US" dirty="0" smtClean="0"/>
+              <a:t>13 Years building enterprise Web applications</a:t>
+            </a:r>
+          </a:p>
+          <a:p>
+            <a:r>
+              <a:rPr lang="en-US" dirty="0" smtClean="0"/>
+              <a:t>Android and </a:t>
+            </a:r>
+            <a:r>
+              <a:rPr lang="en-US" dirty="0" err="1" smtClean="0"/>
+              <a:t>iOS</a:t>
+            </a:r>
+            <a:r>
+              <a:rPr lang="en-US" dirty="0" smtClean="0"/>
+              <a:t> Development</a:t>
+            </a:r>
+          </a:p>
+          <a:p>
+            <a:r>
+              <a:rPr lang="en-US" dirty="0" smtClean="0"/>
+              <a:t>Legacy application migration</a:t>
+            </a:r>
+          </a:p>
+          <a:p>
+            <a:pPr marL="0" indent="0">
+              <a:buNone/>
+            </a:pPr>
+            <a:endParaRPr lang="en-US" dirty="0" smtClean="0"/>
+          </a:p>
+        </p:txBody>
+      </p:sp>
+      <p:pic>
+        <p:nvPicPr>
+          <p:cNvPr id="4" name="Picture 3"/>
+          <p:cNvPicPr>
+            <a:picLocks noChangeAspect="1"/>
+          </p:cNvPicPr>
+          <p:nvPr/>
+        </p:nvPicPr>
+        <p:blipFill>
+          <a:blip r:embed="rId2"/>
+          <a:stretch>
+            <a:fillRect/>
+          </a:stretch>
+        </p:blipFill>
+        <p:spPr>
+          <a:xfrm>
+            <a:off x="10796587" y="6176963"/>
+            <a:ext cx="1114425" cy="495300"/>
+          </a:xfrm>
+          <a:prstGeom prst="rect">
+            <a:avLst/>
+          </a:prstGeom>
+        </p:spPr>
+      </p:pic>
+    </p:spTree>
+    <p:extLst>
+      <p:ext uri="{BB962C8B-B14F-4D97-AF65-F5344CB8AC3E}">
+        <p14:creationId xmlns:p14="http://schemas.microsoft.com/office/powerpoint/2010/main" val="2963992924"/>
+      </p:ext>
+    </p:extLst>
+  </p:cSld>
+  <p:clrMapOvr>
+    <a:masterClrMapping/>
+  </p:clrMapOvr>
+  <p:timing>
+    <p:tnLst>
+      <p:par>
+        <p:cTn id="1" dur="indefinite" restart="never" nodeType="tmRoot"/>
+      </p:par>
+    </p:tnLst>
+  </p:timing>
+</p:sld>
+</file>
+
+<file path=ppt/slides/slide20.xml><?xml version="1.0" encoding="utf-8"?>
+<p:sld xmlns:a="http://schemas.openxmlformats.org/drawingml/2006/main" xmlns:r="http://schemas.openxmlformats.org/officeDocument/2006/relationships" xmlns:p="http://schemas.openxmlformats.org/presentationml/2006/main">
+  <p:cSld>
+    <p:spTree>
+      <p:nvGrpSpPr>
+        <p:cNvPr id="1" name=""/>
+        <p:cNvGrpSpPr/>
+        <p:nvPr/>
+      </p:nvGrpSpPr>
+      <p:grpSpPr>
+        <a:xfrm>
+          <a:off x="0" y="0"/>
+          <a:ext cx="0" cy="0"/>
+          <a:chOff x="0" y="0"/>
+          <a:chExt cx="0" cy="0"/>
+        </a:xfrm>
+      </p:grpSpPr>
+      <p:sp>
+        <p:nvSpPr>
+          <p:cNvPr id="2" name="Title 1"/>
+          <p:cNvSpPr>
+            <a:spLocks noGrp="1"/>
+          </p:cNvSpPr>
+          <p:nvPr>
+            <p:ph type="title"/>
+          </p:nvPr>
+        </p:nvSpPr>
+        <p:spPr/>
+        <p:txBody>
+          <a:bodyPr/>
+          <a:lstStyle/>
+          <a:p>
+            <a:r>
+              <a:rPr lang="en-US" dirty="0" smtClean="0"/>
+              <a:t>Problems</a:t>
+            </a:r>
+            <a:endParaRPr lang="en-US" dirty="0"/>
+          </a:p>
+        </p:txBody>
+      </p:sp>
+      <p:sp>
+        <p:nvSpPr>
+          <p:cNvPr id="3" name="Content Placeholder 2"/>
+          <p:cNvSpPr>
+            <a:spLocks noGrp="1"/>
+          </p:cNvSpPr>
+          <p:nvPr>
+            <p:ph idx="1"/>
+          </p:nvPr>
+        </p:nvSpPr>
+        <p:spPr/>
+        <p:txBody>
+          <a:bodyPr>
+            <a:normAutofit/>
+          </a:bodyPr>
+          <a:lstStyle/>
+          <a:p>
+            <a:r>
+              <a:rPr lang="en-US" dirty="0" smtClean="0"/>
+              <a:t>In Process means the customer waits for all to complete.</a:t>
+            </a:r>
+          </a:p>
+          <a:p>
+            <a:r>
+              <a:rPr lang="en-US" dirty="0" smtClean="0"/>
+              <a:t>Thought of as a Transaction, but it really isn’t.</a:t>
+            </a:r>
+          </a:p>
+          <a:p>
+            <a:r>
+              <a:rPr lang="en-US" dirty="0" smtClean="0"/>
+              <a:t>Failure other than Database insert, shouldn’t break the process.</a:t>
+            </a:r>
+          </a:p>
+          <a:p>
+            <a:r>
+              <a:rPr lang="en-US" dirty="0" smtClean="0"/>
+              <a:t>Asynchronous calls help the UI, but not the process.</a:t>
+            </a:r>
+          </a:p>
+          <a:p>
+            <a:r>
+              <a:rPr lang="en-US" dirty="0" smtClean="0"/>
+              <a:t>Your process is now dependent on an external system.</a:t>
+            </a:r>
+          </a:p>
+        </p:txBody>
+      </p:sp>
+    </p:spTree>
+    <p:extLst>
+      <p:ext uri="{BB962C8B-B14F-4D97-AF65-F5344CB8AC3E}">
+        <p14:creationId xmlns:p14="http://schemas.microsoft.com/office/powerpoint/2010/main" val="1636338860"/>
+      </p:ext>
+    </p:extLst>
+  </p:cSld>
+  <p:clrMapOvr>
+    <a:masterClrMapping/>
+  </p:clrMapOvr>
+  <p:timing>
+    <p:tnLst>
+      <p:par>
+        <p:cTn id="1" dur="indefinite" restart="never" nodeType="tmRoot"/>
+      </p:par>
+    </p:tnLst>
+  </p:timing>
+</p:sld>
+</file>
+
+<file path=ppt/slides/slide21.xml><?xml version="1.0" encoding="utf-8"?>
+<p:sld xmlns:a="http://schemas.openxmlformats.org/drawingml/2006/main" xmlns:r="http://schemas.openxmlformats.org/officeDocument/2006/relationships" xmlns:p="http://schemas.openxmlformats.org/presentationml/2006/main">
+  <p:cSld>
+    <p:spTree>
+      <p:nvGrpSpPr>
+        <p:cNvPr id="1" name=""/>
+        <p:cNvGrpSpPr/>
+        <p:nvPr/>
+      </p:nvGrpSpPr>
+      <p:grpSpPr>
+        <a:xfrm>
+          <a:off x="0" y="0"/>
+          <a:ext cx="0" cy="0"/>
+          <a:chOff x="0" y="0"/>
+          <a:chExt cx="0" cy="0"/>
+        </a:xfrm>
+      </p:grpSpPr>
+      <p:sp>
+        <p:nvSpPr>
+          <p:cNvPr id="2" name="Title 1"/>
+          <p:cNvSpPr>
+            <a:spLocks noGrp="1"/>
+          </p:cNvSpPr>
+          <p:nvPr>
+            <p:ph type="title"/>
+          </p:nvPr>
+        </p:nvSpPr>
+        <p:spPr/>
+        <p:txBody>
+          <a:bodyPr/>
+          <a:lstStyle/>
+          <a:p>
+            <a:r>
+              <a:rPr lang="en-US" dirty="0" smtClean="0"/>
+              <a:t>Potential Solution</a:t>
+            </a:r>
+            <a:endParaRPr lang="en-US" dirty="0"/>
+          </a:p>
+        </p:txBody>
+      </p:sp>
+      <p:pic>
+        <p:nvPicPr>
+          <p:cNvPr id="4" name="Content Placeholder 3"/>
+          <p:cNvPicPr>
+            <a:picLocks noGrp="1" noChangeAspect="1"/>
+          </p:cNvPicPr>
+          <p:nvPr>
+            <p:ph idx="1"/>
+          </p:nvPr>
+        </p:nvPicPr>
+        <p:blipFill>
+          <a:blip r:embed="rId2"/>
+          <a:stretch>
+            <a:fillRect/>
+          </a:stretch>
+        </p:blipFill>
+        <p:spPr>
+          <a:xfrm>
+            <a:off x="3365755" y="1690688"/>
+            <a:ext cx="3345146" cy="5102908"/>
+          </a:xfrm>
+          <a:prstGeom prst="rect">
+            <a:avLst/>
+          </a:prstGeom>
+        </p:spPr>
+      </p:pic>
+    </p:spTree>
+    <p:extLst>
+      <p:ext uri="{BB962C8B-B14F-4D97-AF65-F5344CB8AC3E}">
+        <p14:creationId xmlns:p14="http://schemas.microsoft.com/office/powerpoint/2010/main" val="3295330895"/>
+      </p:ext>
+    </p:extLst>
+  </p:cSld>
+  <p:clrMapOvr>
+    <a:masterClrMapping/>
+  </p:clrMapOvr>
+  <p:timing>
+    <p:tnLst>
+      <p:par>
+        <p:cTn id="1" dur="indefinite" restart="never" nodeType="tmRoot"/>
+      </p:par>
+    </p:tnLst>
+  </p:timing>
+</p:sld>
+</file>
+
+<file path=ppt/slides/slide22.xml><?xml version="1.0" encoding="utf-8"?>
+<p:sld xmlns:a="http://schemas.openxmlformats.org/drawingml/2006/main" xmlns:r="http://schemas.openxmlformats.org/officeDocument/2006/relationships" xmlns:p="http://schemas.openxmlformats.org/presentationml/2006/main">
+  <p:cSld>
+    <p:spTree>
+      <p:nvGrpSpPr>
+        <p:cNvPr id="1" name=""/>
+        <p:cNvGrpSpPr/>
+        <p:nvPr/>
+      </p:nvGrpSpPr>
+      <p:grpSpPr>
+        <a:xfrm>
+          <a:off x="0" y="0"/>
+          <a:ext cx="0" cy="0"/>
+          <a:chOff x="0" y="0"/>
+          <a:chExt cx="0" cy="0"/>
+        </a:xfrm>
+      </p:grpSpPr>
+      <p:sp>
+        <p:nvSpPr>
+          <p:cNvPr id="2" name="Title 1"/>
+          <p:cNvSpPr>
+            <a:spLocks noGrp="1"/>
+          </p:cNvSpPr>
+          <p:nvPr>
+            <p:ph type="title"/>
+          </p:nvPr>
+        </p:nvSpPr>
+        <p:spPr/>
+        <p:txBody>
+          <a:bodyPr/>
+          <a:lstStyle/>
+          <a:p>
+            <a:r>
+              <a:rPr lang="en-US" dirty="0" smtClean="0"/>
+              <a:t>Conditional Message Patterns</a:t>
+            </a:r>
+            <a:endParaRPr lang="en-US" dirty="0"/>
+          </a:p>
+        </p:txBody>
+      </p:sp>
+      <p:sp>
+        <p:nvSpPr>
+          <p:cNvPr id="3" name="Content Placeholder 2"/>
+          <p:cNvSpPr>
+            <a:spLocks noGrp="1"/>
+          </p:cNvSpPr>
+          <p:nvPr>
+            <p:ph idx="1"/>
+          </p:nvPr>
+        </p:nvSpPr>
+        <p:spPr/>
+        <p:txBody>
+          <a:bodyPr/>
+          <a:lstStyle/>
+          <a:p>
+            <a:r>
+              <a:rPr lang="en-US" dirty="0" smtClean="0"/>
+              <a:t>More Complex</a:t>
+            </a:r>
+          </a:p>
+          <a:p>
+            <a:r>
+              <a:rPr lang="en-US" dirty="0" smtClean="0"/>
+              <a:t>Send to a Queue based on criteria</a:t>
+            </a:r>
+            <a:endParaRPr lang="en-US" dirty="0"/>
+          </a:p>
+          <a:p>
+            <a:r>
+              <a:rPr lang="en-US" dirty="0" smtClean="0"/>
+              <a:t>Each Queue has a specific purpose</a:t>
+            </a:r>
+          </a:p>
+          <a:p>
+            <a:r>
+              <a:rPr lang="en-US" dirty="0" smtClean="0"/>
+              <a:t>Usually Associated with an Event message</a:t>
+            </a:r>
+          </a:p>
+        </p:txBody>
+      </p:sp>
+    </p:spTree>
+    <p:extLst>
+      <p:ext uri="{BB962C8B-B14F-4D97-AF65-F5344CB8AC3E}">
+        <p14:creationId xmlns:p14="http://schemas.microsoft.com/office/powerpoint/2010/main" val="161226582"/>
+      </p:ext>
+    </p:extLst>
+  </p:cSld>
+  <p:clrMapOvr>
+    <a:masterClrMapping/>
+  </p:clrMapOvr>
+  <p:timing>
+    <p:tnLst>
+      <p:par>
+        <p:cTn id="1" dur="indefinite" restart="never" nodeType="tmRoot"/>
+      </p:par>
+    </p:tnLst>
+  </p:timing>
+</p:sld>
+</file>
+
+<file path=ppt/slides/slide23.xml><?xml version="1.0" encoding="utf-8"?>
+<p:sld xmlns:a="http://schemas.openxmlformats.org/drawingml/2006/main" xmlns:r="http://schemas.openxmlformats.org/officeDocument/2006/relationships" xmlns:p="http://schemas.openxmlformats.org/presentationml/2006/main">
+  <p:cSld>
+    <p:spTree>
+      <p:nvGrpSpPr>
+        <p:cNvPr id="1" name=""/>
+        <p:cNvGrpSpPr/>
+        <p:nvPr/>
+      </p:nvGrpSpPr>
+      <p:grpSpPr>
+        <a:xfrm>
+          <a:off x="0" y="0"/>
+          <a:ext cx="0" cy="0"/>
+          <a:chOff x="0" y="0"/>
+          <a:chExt cx="0" cy="0"/>
+        </a:xfrm>
+      </p:grpSpPr>
+      <p:sp>
+        <p:nvSpPr>
+          <p:cNvPr id="2" name="Title 1"/>
+          <p:cNvSpPr>
+            <a:spLocks noGrp="1"/>
+          </p:cNvSpPr>
+          <p:nvPr>
+            <p:ph type="title"/>
+          </p:nvPr>
+        </p:nvSpPr>
+        <p:spPr/>
+        <p:txBody>
+          <a:bodyPr/>
+          <a:lstStyle/>
+          <a:p>
+            <a:r>
+              <a:rPr lang="en-US" dirty="0"/>
+              <a:t>Conditional Message Patterns</a:t>
+            </a:r>
+            <a:endParaRPr lang="en-US" dirty="0"/>
+          </a:p>
+        </p:txBody>
+      </p:sp>
+      <p:sp>
+        <p:nvSpPr>
+          <p:cNvPr id="3" name="Content Placeholder 2"/>
+          <p:cNvSpPr>
+            <a:spLocks noGrp="1"/>
+          </p:cNvSpPr>
+          <p:nvPr>
+            <p:ph idx="1"/>
+          </p:nvPr>
+        </p:nvSpPr>
+        <p:spPr/>
+        <p:txBody>
+          <a:bodyPr/>
+          <a:lstStyle/>
+          <a:p>
+            <a:r>
+              <a:rPr lang="en-US" dirty="0" smtClean="0"/>
+              <a:t>Azure</a:t>
+            </a:r>
+          </a:p>
+          <a:p>
+            <a:pPr lvl="1"/>
+            <a:r>
+              <a:rPr lang="en-US" dirty="0" smtClean="0"/>
+              <a:t>Send to Topic</a:t>
+            </a:r>
+          </a:p>
+          <a:p>
+            <a:pPr lvl="1"/>
+            <a:r>
+              <a:rPr lang="en-US" dirty="0" smtClean="0"/>
+              <a:t>Use a Filter Action when creating Subscription</a:t>
+            </a:r>
+          </a:p>
+          <a:p>
+            <a:pPr lvl="1"/>
+            <a:r>
+              <a:rPr lang="en-US" dirty="0" smtClean="0"/>
+              <a:t>Based on System or Custom Property of Message</a:t>
+            </a:r>
+          </a:p>
+          <a:p>
+            <a:r>
+              <a:rPr lang="en-US" dirty="0" err="1" smtClean="0"/>
+              <a:t>RabbitMQ</a:t>
+            </a:r>
+            <a:endParaRPr lang="en-US" dirty="0" smtClean="0"/>
+          </a:p>
+          <a:p>
+            <a:pPr lvl="1"/>
+            <a:r>
+              <a:rPr lang="en-US" dirty="0" smtClean="0"/>
+              <a:t>Direct Exchange with Route Key</a:t>
+            </a:r>
+          </a:p>
+          <a:p>
+            <a:pPr lvl="1"/>
+            <a:r>
+              <a:rPr lang="en-US" dirty="0" smtClean="0"/>
+              <a:t>Topics with Pattern Matching in Route Key</a:t>
+            </a:r>
+          </a:p>
+          <a:p>
+            <a:pPr lvl="1"/>
+            <a:r>
+              <a:rPr lang="en-US" dirty="0" smtClean="0"/>
+              <a:t>Header with Any or All</a:t>
+            </a:r>
+          </a:p>
+        </p:txBody>
+      </p:sp>
+    </p:spTree>
+    <p:extLst>
+      <p:ext uri="{BB962C8B-B14F-4D97-AF65-F5344CB8AC3E}">
+        <p14:creationId xmlns:p14="http://schemas.microsoft.com/office/powerpoint/2010/main" val="1368451895"/>
+      </p:ext>
+    </p:extLst>
+  </p:cSld>
+  <p:clrMapOvr>
+    <a:masterClrMapping/>
+  </p:clrMapOvr>
+  <p:timing>
+    <p:tnLst>
+      <p:par>
+        <p:cTn id="1" dur="indefinite" restart="never" nodeType="tmRoot"/>
+      </p:par>
+    </p:tnLst>
+  </p:timing>
+</p:sld>
+</file>
+
+<file path=ppt/slides/slide24.xml><?xml version="1.0" encoding="utf-8"?>
+<p:sld xmlns:a="http://schemas.openxmlformats.org/drawingml/2006/main" xmlns:r="http://schemas.openxmlformats.org/officeDocument/2006/relationships" xmlns:p="http://schemas.openxmlformats.org/presentationml/2006/main">
+  <p:cSld>
+    <p:spTree>
+      <p:nvGrpSpPr>
+        <p:cNvPr id="1" name=""/>
+        <p:cNvGrpSpPr/>
+        <p:nvPr/>
+      </p:nvGrpSpPr>
+      <p:grpSpPr>
+        <a:xfrm>
+          <a:off x="0" y="0"/>
+          <a:ext cx="0" cy="0"/>
+          <a:chOff x="0" y="0"/>
+          <a:chExt cx="0" cy="0"/>
+        </a:xfrm>
+      </p:grpSpPr>
+      <p:sp>
+        <p:nvSpPr>
+          <p:cNvPr id="2" name="Title 1"/>
+          <p:cNvSpPr>
+            <a:spLocks noGrp="1"/>
+          </p:cNvSpPr>
+          <p:nvPr>
+            <p:ph type="title"/>
+          </p:nvPr>
+        </p:nvSpPr>
+        <p:spPr/>
+        <p:txBody>
+          <a:bodyPr/>
+          <a:lstStyle/>
+          <a:p>
+            <a:r>
+              <a:rPr lang="en-US" dirty="0" smtClean="0"/>
+              <a:t>Direct Exchange with Routing</a:t>
+            </a:r>
+            <a:endParaRPr lang="en-US" dirty="0"/>
+          </a:p>
+        </p:txBody>
+      </p:sp>
+      <p:pic>
+        <p:nvPicPr>
+          <p:cNvPr id="9" name="Picture 8"/>
+          <p:cNvPicPr>
+            <a:picLocks noChangeAspect="1"/>
+          </p:cNvPicPr>
+          <p:nvPr/>
+        </p:nvPicPr>
+        <p:blipFill>
+          <a:blip r:embed="rId2"/>
+          <a:stretch>
+            <a:fillRect/>
+          </a:stretch>
+        </p:blipFill>
+        <p:spPr>
+          <a:xfrm>
+            <a:off x="1757043" y="1798793"/>
+            <a:ext cx="7188174" cy="4577235"/>
+          </a:xfrm>
+          <a:prstGeom prst="rect">
+            <a:avLst/>
+          </a:prstGeom>
+        </p:spPr>
+      </p:pic>
+    </p:spTree>
+    <p:extLst>
+      <p:ext uri="{BB962C8B-B14F-4D97-AF65-F5344CB8AC3E}">
+        <p14:creationId xmlns:p14="http://schemas.microsoft.com/office/powerpoint/2010/main" val="739021563"/>
+      </p:ext>
+    </p:extLst>
+  </p:cSld>
+  <p:clrMapOvr>
+    <a:masterClrMapping/>
+  </p:clrMapOvr>
+  <p:timing>
+    <p:tnLst>
+      <p:par>
+        <p:cTn id="1" dur="indefinite" restart="never" nodeType="tmRoot"/>
+      </p:par>
+    </p:tnLst>
+  </p:timing>
+</p:sld>
+</file>
+
+<file path=ppt/slides/slide25.xml><?xml version="1.0" encoding="utf-8"?>
+<p:sld xmlns:a="http://schemas.openxmlformats.org/drawingml/2006/main" xmlns:r="http://schemas.openxmlformats.org/officeDocument/2006/relationships" xmlns:p="http://schemas.openxmlformats.org/presentationml/2006/main">
+  <p:cSld>
+    <p:spTree>
+      <p:nvGrpSpPr>
+        <p:cNvPr id="1" name=""/>
+        <p:cNvGrpSpPr/>
+        <p:nvPr/>
+      </p:nvGrpSpPr>
+      <p:grpSpPr>
+        <a:xfrm>
+          <a:off x="0" y="0"/>
+          <a:ext cx="0" cy="0"/>
+          <a:chOff x="0" y="0"/>
+          <a:chExt cx="0" cy="0"/>
+        </a:xfrm>
+      </p:grpSpPr>
+      <p:sp>
+        <p:nvSpPr>
+          <p:cNvPr id="2" name="Title 1"/>
+          <p:cNvSpPr>
+            <a:spLocks noGrp="1"/>
+          </p:cNvSpPr>
+          <p:nvPr>
+            <p:ph type="title"/>
+          </p:nvPr>
+        </p:nvSpPr>
+        <p:spPr/>
+        <p:txBody>
+          <a:bodyPr/>
+          <a:lstStyle/>
+          <a:p>
+            <a:r>
+              <a:rPr lang="en-US" dirty="0" smtClean="0"/>
+              <a:t>Direct Exchange Demo</a:t>
+            </a:r>
+            <a:endParaRPr lang="en-US" dirty="0"/>
+          </a:p>
+        </p:txBody>
+      </p:sp>
+      <p:sp>
+        <p:nvSpPr>
+          <p:cNvPr id="3" name="Content Placeholder 2"/>
+          <p:cNvSpPr>
+            <a:spLocks noGrp="1"/>
+          </p:cNvSpPr>
+          <p:nvPr>
+            <p:ph idx="1"/>
+          </p:nvPr>
+        </p:nvSpPr>
+        <p:spPr/>
+        <p:txBody>
+          <a:bodyPr/>
+          <a:lstStyle/>
+          <a:p>
+            <a:r>
+              <a:rPr lang="en-US" dirty="0" smtClean="0"/>
+              <a:t>Demo Routing Projects</a:t>
+            </a:r>
+          </a:p>
+          <a:p>
+            <a:pPr lvl="1"/>
+            <a:r>
+              <a:rPr lang="en-US" dirty="0" err="1" smtClean="0"/>
+              <a:t>RoutingSender</a:t>
+            </a:r>
+            <a:endParaRPr lang="en-US" dirty="0" smtClean="0"/>
+          </a:p>
+          <a:p>
+            <a:pPr lvl="1"/>
+            <a:r>
+              <a:rPr lang="en-US" dirty="0" err="1" smtClean="0"/>
+              <a:t>HandleCars</a:t>
+            </a:r>
+            <a:endParaRPr lang="en-US" dirty="0" smtClean="0"/>
+          </a:p>
+          <a:p>
+            <a:pPr lvl="1"/>
+            <a:r>
+              <a:rPr lang="en-US" dirty="0" err="1" smtClean="0"/>
+              <a:t>HandleTrucks</a:t>
+            </a:r>
+            <a:endParaRPr lang="en-US" dirty="0" smtClean="0"/>
+          </a:p>
+          <a:p>
+            <a:endParaRPr lang="en-US" dirty="0"/>
+          </a:p>
+        </p:txBody>
+      </p:sp>
+    </p:spTree>
+    <p:extLst>
+      <p:ext uri="{BB962C8B-B14F-4D97-AF65-F5344CB8AC3E}">
+        <p14:creationId xmlns:p14="http://schemas.microsoft.com/office/powerpoint/2010/main" val="3479650719"/>
+      </p:ext>
+    </p:extLst>
+  </p:cSld>
+  <p:clrMapOvr>
+    <a:masterClrMapping/>
+  </p:clrMapOvr>
+  <p:timing>
+    <p:tnLst>
+      <p:par>
+        <p:cTn id="1" dur="indefinite" restart="never" nodeType="tmRoot"/>
+      </p:par>
+    </p:tnLst>
+  </p:timing>
+</p:sld>
+</file>
+
+<file path=ppt/slides/slide26.xml><?xml version="1.0" encoding="utf-8"?>
+<p:sld xmlns:a="http://schemas.openxmlformats.org/drawingml/2006/main" xmlns:r="http://schemas.openxmlformats.org/officeDocument/2006/relationships" xmlns:p="http://schemas.openxmlformats.org/presentationml/2006/main">
+  <p:cSld>
+    <p:spTree>
+      <p:nvGrpSpPr>
+        <p:cNvPr id="1" name=""/>
+        <p:cNvGrpSpPr/>
+        <p:nvPr/>
+      </p:nvGrpSpPr>
+      <p:grpSpPr>
+        <a:xfrm>
+          <a:off x="0" y="0"/>
+          <a:ext cx="0" cy="0"/>
+          <a:chOff x="0" y="0"/>
+          <a:chExt cx="0" cy="0"/>
+        </a:xfrm>
+      </p:grpSpPr>
+      <p:sp>
+        <p:nvSpPr>
+          <p:cNvPr id="2" name="Title 1"/>
+          <p:cNvSpPr>
+            <a:spLocks noGrp="1"/>
+          </p:cNvSpPr>
+          <p:nvPr>
+            <p:ph type="title"/>
+          </p:nvPr>
+        </p:nvSpPr>
+        <p:spPr/>
+        <p:txBody>
+          <a:bodyPr/>
+          <a:lstStyle/>
+          <a:p>
+            <a:r>
+              <a:rPr lang="en-US" dirty="0" smtClean="0"/>
+              <a:t>Topic Exchange Demo</a:t>
+            </a:r>
+            <a:endParaRPr lang="en-US" dirty="0"/>
+          </a:p>
+        </p:txBody>
+      </p:sp>
+      <p:sp>
+        <p:nvSpPr>
+          <p:cNvPr id="3" name="Content Placeholder 2"/>
+          <p:cNvSpPr>
+            <a:spLocks noGrp="1"/>
+          </p:cNvSpPr>
+          <p:nvPr>
+            <p:ph idx="1"/>
+          </p:nvPr>
+        </p:nvSpPr>
+        <p:spPr/>
+        <p:txBody>
+          <a:bodyPr/>
+          <a:lstStyle/>
+          <a:p>
+            <a:r>
+              <a:rPr lang="en-US" dirty="0" smtClean="0"/>
+              <a:t>Projects for Demo</a:t>
+            </a:r>
+          </a:p>
+          <a:p>
+            <a:pPr lvl="1"/>
+            <a:r>
+              <a:rPr lang="en-US" dirty="0" err="1" smtClean="0"/>
+              <a:t>SendStoreTransaction</a:t>
+            </a:r>
+            <a:endParaRPr lang="en-US" dirty="0" smtClean="0"/>
+          </a:p>
+          <a:p>
+            <a:pPr lvl="1"/>
+            <a:r>
+              <a:rPr lang="en-US" dirty="0" err="1" smtClean="0"/>
+              <a:t>HandleSales</a:t>
+            </a:r>
+            <a:endParaRPr lang="en-US" dirty="0" smtClean="0"/>
+          </a:p>
+          <a:p>
+            <a:pPr lvl="1"/>
+            <a:r>
+              <a:rPr lang="en-US" dirty="0" err="1" smtClean="0"/>
+              <a:t>HandleDiscounts</a:t>
+            </a:r>
+            <a:endParaRPr lang="en-US" dirty="0"/>
+          </a:p>
+        </p:txBody>
+      </p:sp>
+    </p:spTree>
+    <p:extLst>
+      <p:ext uri="{BB962C8B-B14F-4D97-AF65-F5344CB8AC3E}">
+        <p14:creationId xmlns:p14="http://schemas.microsoft.com/office/powerpoint/2010/main" val="36210603"/>
+      </p:ext>
+    </p:extLst>
+  </p:cSld>
+  <p:clrMapOvr>
+    <a:masterClrMapping/>
+  </p:clrMapOvr>
+  <p:timing>
+    <p:tnLst>
+      <p:par>
+        <p:cTn id="1" dur="indefinite" restart="never" nodeType="tmRoot"/>
+      </p:par>
+    </p:tnLst>
+  </p:timing>
+</p:sld>
+</file>
+
+<file path=ppt/slides/slide27.xml><?xml version="1.0" encoding="utf-8"?>
+<p:sld xmlns:a="http://schemas.openxmlformats.org/drawingml/2006/main" xmlns:r="http://schemas.openxmlformats.org/officeDocument/2006/relationships" xmlns:p="http://schemas.openxmlformats.org/presentationml/2006/main">
+  <p:cSld>
+    <p:spTree>
+      <p:nvGrpSpPr>
+        <p:cNvPr id="1" name=""/>
+        <p:cNvGrpSpPr/>
+        <p:nvPr/>
+      </p:nvGrpSpPr>
+      <p:grpSpPr>
+        <a:xfrm>
+          <a:off x="0" y="0"/>
+          <a:ext cx="0" cy="0"/>
+          <a:chOff x="0" y="0"/>
+          <a:chExt cx="0" cy="0"/>
+        </a:xfrm>
+      </p:grpSpPr>
+      <p:sp>
+        <p:nvSpPr>
+          <p:cNvPr id="2" name="Title 1"/>
+          <p:cNvSpPr>
+            <a:spLocks noGrp="1"/>
+          </p:cNvSpPr>
+          <p:nvPr>
+            <p:ph type="title"/>
+          </p:nvPr>
+        </p:nvSpPr>
+        <p:spPr/>
+        <p:txBody>
+          <a:bodyPr/>
+          <a:lstStyle/>
+          <a:p>
+            <a:r>
+              <a:rPr lang="en-US" dirty="0" smtClean="0"/>
+              <a:t>Headers Exchange Demo</a:t>
+            </a:r>
+            <a:endParaRPr lang="en-US" dirty="0"/>
+          </a:p>
+        </p:txBody>
+      </p:sp>
+      <p:sp>
+        <p:nvSpPr>
+          <p:cNvPr id="3" name="Content Placeholder 2"/>
+          <p:cNvSpPr>
+            <a:spLocks noGrp="1"/>
+          </p:cNvSpPr>
+          <p:nvPr>
+            <p:ph idx="1"/>
+          </p:nvPr>
+        </p:nvSpPr>
+        <p:spPr/>
+        <p:txBody>
+          <a:bodyPr/>
+          <a:lstStyle/>
+          <a:p>
+            <a:r>
+              <a:rPr lang="en-US" dirty="0" smtClean="0"/>
+              <a:t>Demo </a:t>
+            </a:r>
+            <a:r>
+              <a:rPr lang="en-US" dirty="0" err="1" smtClean="0"/>
+              <a:t>Projets</a:t>
+            </a:r>
+            <a:endParaRPr lang="en-US" dirty="0" smtClean="0"/>
+          </a:p>
+          <a:p>
+            <a:pPr lvl="1"/>
+            <a:r>
+              <a:rPr lang="en-US" dirty="0" err="1" smtClean="0"/>
+              <a:t>SendHeaders</a:t>
+            </a:r>
+            <a:endParaRPr lang="en-US" dirty="0" smtClean="0"/>
+          </a:p>
+          <a:p>
+            <a:pPr lvl="1"/>
+            <a:r>
+              <a:rPr lang="en-US" dirty="0" err="1" smtClean="0"/>
+              <a:t>HandlAllHeaders</a:t>
+            </a:r>
+            <a:endParaRPr lang="en-US" dirty="0" smtClean="0"/>
+          </a:p>
+          <a:p>
+            <a:pPr lvl="1"/>
+            <a:r>
+              <a:rPr lang="en-US" smtClean="0"/>
+              <a:t>HandleAnyHeaders</a:t>
+            </a:r>
+            <a:endParaRPr lang="en-US" dirty="0"/>
+          </a:p>
+        </p:txBody>
+      </p:sp>
+    </p:spTree>
+    <p:extLst>
+      <p:ext uri="{BB962C8B-B14F-4D97-AF65-F5344CB8AC3E}">
+        <p14:creationId xmlns:p14="http://schemas.microsoft.com/office/powerpoint/2010/main" val="3328962385"/>
+      </p:ext>
+    </p:extLst>
+  </p:cSld>
+  <p:clrMapOvr>
+    <a:masterClrMapping/>
+  </p:clrMapOvr>
+  <p:timing>
+    <p:tnLst>
+      <p:par>
+        <p:cTn id="1" dur="indefinite" restart="never" nodeType="tmRoot"/>
+      </p:par>
+    </p:tnLst>
+  </p:timing>
+</p:sld>
+</file>
+
+<file path=ppt/slides/slide28.xml><?xml version="1.0" encoding="utf-8"?>
+<p:sld xmlns:a="http://schemas.openxmlformats.org/drawingml/2006/main" xmlns:r="http://schemas.openxmlformats.org/officeDocument/2006/relationships" xmlns:p="http://schemas.openxmlformats.org/presentationml/2006/main">
+  <p:cSld>
+    <p:spTree>
+      <p:nvGrpSpPr>
+        <p:cNvPr id="1" name=""/>
+        <p:cNvGrpSpPr/>
+        <p:nvPr/>
+      </p:nvGrpSpPr>
+      <p:grpSpPr>
+        <a:xfrm>
+          <a:off x="0" y="0"/>
+          <a:ext cx="0" cy="0"/>
+          <a:chOff x="0" y="0"/>
+          <a:chExt cx="0" cy="0"/>
+        </a:xfrm>
+      </p:grpSpPr>
+      <p:sp>
+        <p:nvSpPr>
+          <p:cNvPr id="2" name="Title 1"/>
+          <p:cNvSpPr>
+            <a:spLocks noGrp="1"/>
+          </p:cNvSpPr>
+          <p:nvPr>
+            <p:ph type="title"/>
+          </p:nvPr>
+        </p:nvSpPr>
+        <p:spPr/>
+        <p:txBody>
+          <a:bodyPr/>
+          <a:lstStyle/>
+          <a:p>
+            <a:r>
+              <a:rPr lang="en-US" dirty="0" smtClean="0"/>
+              <a:t>The Scenario – If Check in Handler</a:t>
+            </a:r>
+            <a:endParaRPr lang="en-US" dirty="0"/>
+          </a:p>
+        </p:txBody>
+      </p:sp>
+      <p:pic>
+        <p:nvPicPr>
+          <p:cNvPr id="4" name="Content Placeholder 3"/>
+          <p:cNvPicPr>
+            <a:picLocks noGrp="1" noChangeAspect="1"/>
+          </p:cNvPicPr>
+          <p:nvPr>
+            <p:ph idx="1"/>
+          </p:nvPr>
+        </p:nvPicPr>
+        <p:blipFill>
+          <a:blip r:embed="rId2"/>
+          <a:stretch>
+            <a:fillRect/>
+          </a:stretch>
+        </p:blipFill>
+        <p:spPr>
+          <a:xfrm>
+            <a:off x="3155353" y="1316976"/>
+            <a:ext cx="2617294" cy="5516011"/>
+          </a:xfrm>
+          <a:prstGeom prst="rect">
+            <a:avLst/>
+          </a:prstGeom>
+        </p:spPr>
+      </p:pic>
+    </p:spTree>
+    <p:extLst>
+      <p:ext uri="{BB962C8B-B14F-4D97-AF65-F5344CB8AC3E}">
+        <p14:creationId xmlns:p14="http://schemas.microsoft.com/office/powerpoint/2010/main" val="3762935657"/>
+      </p:ext>
+    </p:extLst>
+  </p:cSld>
+  <p:clrMapOvr>
+    <a:masterClrMapping/>
+  </p:clrMapOvr>
+  <p:timing>
+    <p:tnLst>
+      <p:par>
+        <p:cTn id="1" dur="indefinite" restart="never" nodeType="tmRoot"/>
+      </p:par>
+    </p:tnLst>
+  </p:timing>
+</p:sld>
+</file>
+
+<file path=ppt/slides/slide29.xml><?xml version="1.0" encoding="utf-8"?>
+<p:sld xmlns:a="http://schemas.openxmlformats.org/drawingml/2006/main" xmlns:r="http://schemas.openxmlformats.org/officeDocument/2006/relationships" xmlns:p="http://schemas.openxmlformats.org/presentationml/2006/main">
+  <p:cSld>
+    <p:spTree>
+      <p:nvGrpSpPr>
+        <p:cNvPr id="1" name=""/>
+        <p:cNvGrpSpPr/>
+        <p:nvPr/>
+      </p:nvGrpSpPr>
+      <p:grpSpPr>
+        <a:xfrm>
+          <a:off x="0" y="0"/>
+          <a:ext cx="0" cy="0"/>
+          <a:chOff x="0" y="0"/>
+          <a:chExt cx="0" cy="0"/>
+        </a:xfrm>
+      </p:grpSpPr>
+      <p:sp>
+        <p:nvSpPr>
+          <p:cNvPr id="2" name="Title 1"/>
+          <p:cNvSpPr>
+            <a:spLocks noGrp="1"/>
+          </p:cNvSpPr>
+          <p:nvPr>
+            <p:ph type="title"/>
+          </p:nvPr>
+        </p:nvSpPr>
+        <p:spPr/>
+        <p:txBody>
+          <a:bodyPr/>
+          <a:lstStyle/>
+          <a:p>
+            <a:r>
+              <a:rPr lang="en-US" dirty="0" smtClean="0"/>
+              <a:t>Problems</a:t>
+            </a:r>
+            <a:endParaRPr lang="en-US" dirty="0"/>
+          </a:p>
+        </p:txBody>
+      </p:sp>
+      <p:sp>
+        <p:nvSpPr>
+          <p:cNvPr id="3" name="Content Placeholder 2"/>
+          <p:cNvSpPr>
+            <a:spLocks noGrp="1"/>
+          </p:cNvSpPr>
+          <p:nvPr>
+            <p:ph idx="1"/>
+          </p:nvPr>
+        </p:nvSpPr>
+        <p:spPr/>
+        <p:txBody>
+          <a:bodyPr/>
+          <a:lstStyle/>
+          <a:p>
+            <a:r>
+              <a:rPr lang="en-US" dirty="0" smtClean="0"/>
+              <a:t>Process Orders has multiple concerns</a:t>
+            </a:r>
+          </a:p>
+          <a:p>
+            <a:r>
+              <a:rPr lang="en-US" dirty="0" smtClean="0"/>
+              <a:t>New Product Processing Failure fails Process Orders</a:t>
+            </a:r>
+          </a:p>
+          <a:p>
+            <a:r>
+              <a:rPr lang="en-US" dirty="0" smtClean="0"/>
+              <a:t>Next specialty adds another if check</a:t>
+            </a:r>
+          </a:p>
+          <a:p>
+            <a:r>
+              <a:rPr lang="en-US" dirty="0" smtClean="0"/>
+              <a:t>Process Orders is More important, don’t risk breaking it</a:t>
+            </a:r>
+            <a:endParaRPr lang="en-US" dirty="0"/>
+          </a:p>
+        </p:txBody>
+      </p:sp>
+    </p:spTree>
+    <p:extLst>
+      <p:ext uri="{BB962C8B-B14F-4D97-AF65-F5344CB8AC3E}">
+        <p14:creationId xmlns:p14="http://schemas.microsoft.com/office/powerpoint/2010/main" val="829889442"/>
+      </p:ext>
+    </p:extLst>
+  </p:cSld>
+  <p:clrMapOvr>
+    <a:masterClrMapping/>
+  </p:clrMapOvr>
+  <p:timing>
+    <p:tnLst>
+      <p:par>
+        <p:cTn id="1" dur="indefinite" restart="never" nodeType="tmRoot"/>
+      </p:par>
+    </p:tnLst>
+  </p:timing>
+</p:sld>
+</file>
+
+<file path=ppt/slides/slide3.xml><?xml version="1.0" encoding="utf-8"?>
 <p:sld xmlns:a="http://schemas.openxmlformats.org/drawingml/2006/main" xmlns:r="http://schemas.openxmlformats.org/officeDocument/2006/relationships" xmlns:p="http://schemas.openxmlformats.org/presentationml/2006/main">
   <p:cSld>
     <p:spTree>
@@ -5174,1190 +5842,6 @@
 </p:sld>
 </file>
 
-<file path=ppt/slides/slide20.xml><?xml version="1.0" encoding="utf-8"?>
-<p:sld xmlns:a="http://schemas.openxmlformats.org/drawingml/2006/main" xmlns:r="http://schemas.openxmlformats.org/officeDocument/2006/relationships" xmlns:p="http://schemas.openxmlformats.org/presentationml/2006/main">
-  <p:cSld>
-    <p:spTree>
-      <p:nvGrpSpPr>
-        <p:cNvPr id="1" name=""/>
-        <p:cNvGrpSpPr/>
-        <p:nvPr/>
-      </p:nvGrpSpPr>
-      <p:grpSpPr>
-        <a:xfrm>
-          <a:off x="0" y="0"/>
-          <a:ext cx="0" cy="0"/>
-          <a:chOff x="0" y="0"/>
-          <a:chExt cx="0" cy="0"/>
-        </a:xfrm>
-      </p:grpSpPr>
-      <p:sp>
-        <p:nvSpPr>
-          <p:cNvPr id="2" name="Title 1"/>
-          <p:cNvSpPr>
-            <a:spLocks noGrp="1"/>
-          </p:cNvSpPr>
-          <p:nvPr>
-            <p:ph type="title"/>
-          </p:nvPr>
-        </p:nvSpPr>
-        <p:spPr/>
-        <p:txBody>
-          <a:bodyPr/>
-          <a:lstStyle/>
-          <a:p>
-            <a:r>
-              <a:rPr lang="en-US" dirty="0" smtClean="0"/>
-              <a:t>Headers Exchange Example</a:t>
-            </a:r>
-            <a:endParaRPr lang="en-US" dirty="0"/>
-          </a:p>
-        </p:txBody>
-      </p:sp>
-      <p:sp>
-        <p:nvSpPr>
-          <p:cNvPr id="3" name="Content Placeholder 2"/>
-          <p:cNvSpPr>
-            <a:spLocks noGrp="1"/>
-          </p:cNvSpPr>
-          <p:nvPr>
-            <p:ph idx="1"/>
-          </p:nvPr>
-        </p:nvSpPr>
-        <p:spPr/>
-        <p:txBody>
-          <a:bodyPr/>
-          <a:lstStyle/>
-          <a:p>
-            <a:r>
-              <a:rPr lang="en-US" dirty="0" smtClean="0"/>
-              <a:t>NFC North Queue with the following headers</a:t>
-            </a:r>
-          </a:p>
-          <a:p>
-            <a:pPr lvl="1"/>
-            <a:r>
-              <a:rPr lang="en-US" dirty="0"/>
-              <a:t>x</a:t>
-            </a:r>
-            <a:r>
-              <a:rPr lang="en-US" dirty="0" smtClean="0"/>
-              <a:t>-match = “all”</a:t>
-            </a:r>
-          </a:p>
-          <a:p>
-            <a:pPr lvl="1"/>
-            <a:r>
-              <a:rPr lang="en-US" dirty="0" smtClean="0"/>
-              <a:t>sport = “football”</a:t>
-            </a:r>
-          </a:p>
-          <a:p>
-            <a:pPr lvl="1"/>
-            <a:r>
-              <a:rPr lang="en-US" dirty="0"/>
-              <a:t>d</a:t>
-            </a:r>
-            <a:r>
-              <a:rPr lang="en-US" dirty="0" smtClean="0"/>
-              <a:t>ivision = “</a:t>
-            </a:r>
-            <a:r>
-              <a:rPr lang="en-US" dirty="0" err="1" smtClean="0"/>
-              <a:t>nfcnorth</a:t>
-            </a:r>
-            <a:r>
-              <a:rPr lang="en-US" dirty="0" smtClean="0"/>
-              <a:t>”</a:t>
-            </a:r>
-            <a:endParaRPr lang="en-US" dirty="0"/>
-          </a:p>
-          <a:p>
-            <a:pPr lvl="1"/>
-            <a:endParaRPr lang="en-US" dirty="0"/>
-          </a:p>
-          <a:p>
-            <a:r>
-              <a:rPr lang="en-US" dirty="0" smtClean="0"/>
-              <a:t>Will only accept message that have a header sport = football and division = “</a:t>
-            </a:r>
-            <a:r>
-              <a:rPr lang="en-US" dirty="0" err="1" smtClean="0"/>
-              <a:t>nfcnorth</a:t>
-            </a:r>
-            <a:endParaRPr lang="en-US" dirty="0" smtClean="0"/>
-          </a:p>
-          <a:p>
-            <a:r>
-              <a:rPr lang="en-US" dirty="0" smtClean="0"/>
-              <a:t>If x-match was set to “any”</a:t>
-            </a:r>
-          </a:p>
-          <a:p>
-            <a:r>
-              <a:rPr lang="en-US" dirty="0" smtClean="0"/>
-              <a:t>Sport = “football” with division = “</a:t>
-            </a:r>
-            <a:r>
-              <a:rPr lang="en-US" dirty="0" err="1" smtClean="0"/>
-              <a:t>afcnorth</a:t>
-            </a:r>
-            <a:r>
-              <a:rPr lang="en-US" dirty="0" smtClean="0"/>
-              <a:t>” the message would be accepted</a:t>
-            </a:r>
-          </a:p>
-        </p:txBody>
-      </p:sp>
-    </p:spTree>
-    <p:extLst>
-      <p:ext uri="{BB962C8B-B14F-4D97-AF65-F5344CB8AC3E}">
-        <p14:creationId xmlns:p14="http://schemas.microsoft.com/office/powerpoint/2010/main" val="2369467332"/>
-      </p:ext>
-    </p:extLst>
-  </p:cSld>
-  <p:clrMapOvr>
-    <a:masterClrMapping/>
-  </p:clrMapOvr>
-  <p:timing>
-    <p:tnLst>
-      <p:par>
-        <p:cTn id="1" dur="indefinite" restart="never" nodeType="tmRoot"/>
-      </p:par>
-    </p:tnLst>
-  </p:timing>
-</p:sld>
-</file>
-
-<file path=ppt/slides/slide21.xml><?xml version="1.0" encoding="utf-8"?>
-<p:sld xmlns:a="http://schemas.openxmlformats.org/drawingml/2006/main" xmlns:r="http://schemas.openxmlformats.org/officeDocument/2006/relationships" xmlns:p="http://schemas.openxmlformats.org/presentationml/2006/main">
-  <p:cSld>
-    <p:spTree>
-      <p:nvGrpSpPr>
-        <p:cNvPr id="1" name=""/>
-        <p:cNvGrpSpPr/>
-        <p:nvPr/>
-      </p:nvGrpSpPr>
-      <p:grpSpPr>
-        <a:xfrm>
-          <a:off x="0" y="0"/>
-          <a:ext cx="0" cy="0"/>
-          <a:chOff x="0" y="0"/>
-          <a:chExt cx="0" cy="0"/>
-        </a:xfrm>
-      </p:grpSpPr>
-      <p:sp>
-        <p:nvSpPr>
-          <p:cNvPr id="2" name="Title 1"/>
-          <p:cNvSpPr>
-            <a:spLocks noGrp="1"/>
-          </p:cNvSpPr>
-          <p:nvPr>
-            <p:ph type="title"/>
-          </p:nvPr>
-        </p:nvSpPr>
-        <p:spPr/>
-        <p:txBody>
-          <a:bodyPr/>
-          <a:lstStyle/>
-          <a:p>
-            <a:r>
-              <a:rPr lang="en-US" dirty="0" smtClean="0"/>
-              <a:t>Headers Exchange Demo</a:t>
-            </a:r>
-            <a:endParaRPr lang="en-US" dirty="0"/>
-          </a:p>
-        </p:txBody>
-      </p:sp>
-      <p:sp>
-        <p:nvSpPr>
-          <p:cNvPr id="3" name="Content Placeholder 2"/>
-          <p:cNvSpPr>
-            <a:spLocks noGrp="1"/>
-          </p:cNvSpPr>
-          <p:nvPr>
-            <p:ph idx="1"/>
-          </p:nvPr>
-        </p:nvSpPr>
-        <p:spPr/>
-        <p:txBody>
-          <a:bodyPr/>
-          <a:lstStyle/>
-          <a:p>
-            <a:r>
-              <a:rPr lang="en-US" dirty="0" smtClean="0"/>
-              <a:t>Demo </a:t>
-            </a:r>
-            <a:r>
-              <a:rPr lang="en-US" dirty="0" err="1" smtClean="0"/>
-              <a:t>Projets</a:t>
-            </a:r>
-            <a:endParaRPr lang="en-US" dirty="0" smtClean="0"/>
-          </a:p>
-          <a:p>
-            <a:pPr lvl="1"/>
-            <a:r>
-              <a:rPr lang="en-US" dirty="0" err="1" smtClean="0"/>
-              <a:t>SendHeaders</a:t>
-            </a:r>
-            <a:endParaRPr lang="en-US" dirty="0" smtClean="0"/>
-          </a:p>
-          <a:p>
-            <a:pPr lvl="1"/>
-            <a:r>
-              <a:rPr lang="en-US" dirty="0" err="1" smtClean="0"/>
-              <a:t>HandlAllHeaders</a:t>
-            </a:r>
-            <a:endParaRPr lang="en-US" dirty="0" smtClean="0"/>
-          </a:p>
-          <a:p>
-            <a:pPr lvl="1"/>
-            <a:r>
-              <a:rPr lang="en-US" smtClean="0"/>
-              <a:t>HandleAnyHeaders</a:t>
-            </a:r>
-            <a:endParaRPr lang="en-US" dirty="0"/>
-          </a:p>
-        </p:txBody>
-      </p:sp>
-    </p:spTree>
-    <p:extLst>
-      <p:ext uri="{BB962C8B-B14F-4D97-AF65-F5344CB8AC3E}">
-        <p14:creationId xmlns:p14="http://schemas.microsoft.com/office/powerpoint/2010/main" val="4213189113"/>
-      </p:ext>
-    </p:extLst>
-  </p:cSld>
-  <p:clrMapOvr>
-    <a:masterClrMapping/>
-  </p:clrMapOvr>
-  <p:timing>
-    <p:tnLst>
-      <p:par>
-        <p:cTn id="1" dur="indefinite" restart="never" nodeType="tmRoot"/>
-      </p:par>
-    </p:tnLst>
-  </p:timing>
-</p:sld>
-</file>
-
-<file path=ppt/slides/slide22.xml><?xml version="1.0" encoding="utf-8"?>
-<p:sld xmlns:a="http://schemas.openxmlformats.org/drawingml/2006/main" xmlns:r="http://schemas.openxmlformats.org/officeDocument/2006/relationships" xmlns:p="http://schemas.openxmlformats.org/presentationml/2006/main">
-  <p:cSld>
-    <p:spTree>
-      <p:nvGrpSpPr>
-        <p:cNvPr id="1" name=""/>
-        <p:cNvGrpSpPr/>
-        <p:nvPr/>
-      </p:nvGrpSpPr>
-      <p:grpSpPr>
-        <a:xfrm>
-          <a:off x="0" y="0"/>
-          <a:ext cx="0" cy="0"/>
-          <a:chOff x="0" y="0"/>
-          <a:chExt cx="0" cy="0"/>
-        </a:xfrm>
-      </p:grpSpPr>
-      <p:sp>
-        <p:nvSpPr>
-          <p:cNvPr id="2" name="Title 1"/>
-          <p:cNvSpPr>
-            <a:spLocks noGrp="1"/>
-          </p:cNvSpPr>
-          <p:nvPr>
-            <p:ph type="title"/>
-          </p:nvPr>
-        </p:nvSpPr>
-        <p:spPr/>
-        <p:txBody>
-          <a:bodyPr/>
-          <a:lstStyle/>
-          <a:p>
-            <a:r>
-              <a:rPr lang="en-US" dirty="0" smtClean="0"/>
-              <a:t>Scenarios</a:t>
-            </a:r>
-            <a:endParaRPr lang="en-US" dirty="0"/>
-          </a:p>
-        </p:txBody>
-      </p:sp>
-      <p:sp>
-        <p:nvSpPr>
-          <p:cNvPr id="3" name="Content Placeholder 2"/>
-          <p:cNvSpPr>
-            <a:spLocks noGrp="1"/>
-          </p:cNvSpPr>
-          <p:nvPr>
-            <p:ph idx="1"/>
-          </p:nvPr>
-        </p:nvSpPr>
-        <p:spPr/>
-        <p:txBody>
-          <a:bodyPr/>
-          <a:lstStyle/>
-          <a:p>
-            <a:r>
-              <a:rPr lang="en-US" dirty="0" smtClean="0"/>
-              <a:t>Batch Processing and Process/Status Flags</a:t>
-            </a:r>
-          </a:p>
-          <a:p>
-            <a:r>
-              <a:rPr lang="en-US" dirty="0" smtClean="0"/>
-              <a:t>Data Duplication</a:t>
-            </a:r>
-          </a:p>
-          <a:p>
-            <a:r>
-              <a:rPr lang="en-US" dirty="0" smtClean="0"/>
-              <a:t>Blocking Processes</a:t>
-            </a:r>
-            <a:endParaRPr lang="en-US" dirty="0"/>
-          </a:p>
-        </p:txBody>
-      </p:sp>
-    </p:spTree>
-    <p:extLst>
-      <p:ext uri="{BB962C8B-B14F-4D97-AF65-F5344CB8AC3E}">
-        <p14:creationId xmlns:p14="http://schemas.microsoft.com/office/powerpoint/2010/main" val="1324074212"/>
-      </p:ext>
-    </p:extLst>
-  </p:cSld>
-  <p:clrMapOvr>
-    <a:masterClrMapping/>
-  </p:clrMapOvr>
-  <p:timing>
-    <p:tnLst>
-      <p:par>
-        <p:cTn id="1" dur="indefinite" restart="never" nodeType="tmRoot"/>
-      </p:par>
-    </p:tnLst>
-  </p:timing>
-</p:sld>
-</file>
-
-<file path=ppt/slides/slide23.xml><?xml version="1.0" encoding="utf-8"?>
-<p:sld xmlns:a="http://schemas.openxmlformats.org/drawingml/2006/main" xmlns:r="http://schemas.openxmlformats.org/officeDocument/2006/relationships" xmlns:p="http://schemas.openxmlformats.org/presentationml/2006/main">
-  <p:cSld>
-    <p:spTree>
-      <p:nvGrpSpPr>
-        <p:cNvPr id="1" name=""/>
-        <p:cNvGrpSpPr/>
-        <p:nvPr/>
-      </p:nvGrpSpPr>
-      <p:grpSpPr>
-        <a:xfrm>
-          <a:off x="0" y="0"/>
-          <a:ext cx="0" cy="0"/>
-          <a:chOff x="0" y="0"/>
-          <a:chExt cx="0" cy="0"/>
-        </a:xfrm>
-      </p:grpSpPr>
-      <p:sp>
-        <p:nvSpPr>
-          <p:cNvPr id="2" name="Title 1"/>
-          <p:cNvSpPr>
-            <a:spLocks noGrp="1"/>
-          </p:cNvSpPr>
-          <p:nvPr>
-            <p:ph type="title"/>
-          </p:nvPr>
-        </p:nvSpPr>
-        <p:spPr/>
-        <p:txBody>
-          <a:bodyPr/>
-          <a:lstStyle/>
-          <a:p>
-            <a:r>
-              <a:rPr lang="en-US" dirty="0" smtClean="0"/>
-              <a:t>The Scenario – Batch Process</a:t>
-            </a:r>
-            <a:endParaRPr lang="en-US" dirty="0"/>
-          </a:p>
-        </p:txBody>
-      </p:sp>
-      <p:pic>
-        <p:nvPicPr>
-          <p:cNvPr id="12" name="Content Placeholder 11"/>
-          <p:cNvPicPr>
-            <a:picLocks noGrp="1" noChangeAspect="1"/>
-          </p:cNvPicPr>
-          <p:nvPr>
-            <p:ph idx="1"/>
-          </p:nvPr>
-        </p:nvPicPr>
-        <p:blipFill>
-          <a:blip r:embed="rId2"/>
-          <a:stretch>
-            <a:fillRect/>
-          </a:stretch>
-        </p:blipFill>
-        <p:spPr>
-          <a:xfrm>
-            <a:off x="3228299" y="1690688"/>
-            <a:ext cx="3726334" cy="4958896"/>
-          </a:xfrm>
-          <a:prstGeom prst="rect">
-            <a:avLst/>
-          </a:prstGeom>
-        </p:spPr>
-      </p:pic>
-    </p:spTree>
-    <p:extLst>
-      <p:ext uri="{BB962C8B-B14F-4D97-AF65-F5344CB8AC3E}">
-        <p14:creationId xmlns:p14="http://schemas.microsoft.com/office/powerpoint/2010/main" val="522960924"/>
-      </p:ext>
-    </p:extLst>
-  </p:cSld>
-  <p:clrMapOvr>
-    <a:masterClrMapping/>
-  </p:clrMapOvr>
-  <p:timing>
-    <p:tnLst>
-      <p:par>
-        <p:cTn id="1" dur="indefinite" restart="never" nodeType="tmRoot"/>
-      </p:par>
-    </p:tnLst>
-  </p:timing>
-</p:sld>
-</file>
-
-<file path=ppt/slides/slide24.xml><?xml version="1.0" encoding="utf-8"?>
-<p:sld xmlns:a="http://schemas.openxmlformats.org/drawingml/2006/main" xmlns:r="http://schemas.openxmlformats.org/officeDocument/2006/relationships" xmlns:p="http://schemas.openxmlformats.org/presentationml/2006/main">
-  <p:cSld>
-    <p:spTree>
-      <p:nvGrpSpPr>
-        <p:cNvPr id="1" name=""/>
-        <p:cNvGrpSpPr/>
-        <p:nvPr/>
-      </p:nvGrpSpPr>
-      <p:grpSpPr>
-        <a:xfrm>
-          <a:off x="0" y="0"/>
-          <a:ext cx="0" cy="0"/>
-          <a:chOff x="0" y="0"/>
-          <a:chExt cx="0" cy="0"/>
-        </a:xfrm>
-      </p:grpSpPr>
-      <p:sp>
-        <p:nvSpPr>
-          <p:cNvPr id="2" name="Title 1"/>
-          <p:cNvSpPr>
-            <a:spLocks noGrp="1"/>
-          </p:cNvSpPr>
-          <p:nvPr>
-            <p:ph type="title"/>
-          </p:nvPr>
-        </p:nvSpPr>
-        <p:spPr/>
-        <p:txBody>
-          <a:bodyPr/>
-          <a:lstStyle/>
-          <a:p>
-            <a:r>
-              <a:rPr lang="en-US" dirty="0" smtClean="0"/>
-              <a:t>Problems</a:t>
-            </a:r>
-            <a:endParaRPr lang="en-US" dirty="0"/>
-          </a:p>
-        </p:txBody>
-      </p:sp>
-      <p:sp>
-        <p:nvSpPr>
-          <p:cNvPr id="3" name="Content Placeholder 2"/>
-          <p:cNvSpPr>
-            <a:spLocks noGrp="1"/>
-          </p:cNvSpPr>
-          <p:nvPr>
-            <p:ph idx="1"/>
-          </p:nvPr>
-        </p:nvSpPr>
-        <p:spPr/>
-        <p:txBody>
-          <a:bodyPr>
-            <a:normAutofit/>
-          </a:bodyPr>
-          <a:lstStyle/>
-          <a:p>
-            <a:r>
-              <a:rPr lang="en-US" dirty="0" smtClean="0"/>
-              <a:t>The IsProcessed field means nothing to the data after set to true</a:t>
-            </a:r>
-          </a:p>
-          <a:p>
-            <a:r>
-              <a:rPr lang="en-US" dirty="0" smtClean="0"/>
-              <a:t>The larger the table gets, the more data you need to query over</a:t>
-            </a:r>
-          </a:p>
-          <a:p>
-            <a:r>
-              <a:rPr lang="en-US" dirty="0" smtClean="0"/>
-              <a:t>New Data isn’t available until the job runs.</a:t>
-            </a:r>
-          </a:p>
-          <a:p>
-            <a:r>
-              <a:rPr lang="en-US" dirty="0" smtClean="0"/>
-              <a:t>Set </a:t>
-            </a:r>
-            <a:r>
-              <a:rPr lang="en-US" dirty="0"/>
-              <a:t>based transactions or row by row. </a:t>
-            </a:r>
-            <a:endParaRPr lang="en-US" dirty="0" smtClean="0"/>
-          </a:p>
-          <a:p>
-            <a:r>
-              <a:rPr lang="en-US" dirty="0" smtClean="0"/>
-              <a:t>Failures </a:t>
-            </a:r>
-            <a:r>
-              <a:rPr lang="en-US" dirty="0"/>
-              <a:t>lead to longer delays</a:t>
-            </a:r>
-            <a:r>
-              <a:rPr lang="en-US" dirty="0" smtClean="0"/>
-              <a:t>.</a:t>
-            </a:r>
-          </a:p>
-          <a:p>
-            <a:r>
-              <a:rPr lang="en-US" dirty="0"/>
-              <a:t>Product Owner, decides there is another process we want to run on the original data.  Add another flag and batch job?</a:t>
-            </a:r>
-          </a:p>
-          <a:p>
-            <a:endParaRPr lang="en-US" dirty="0"/>
-          </a:p>
-          <a:p>
-            <a:endParaRPr lang="en-US" dirty="0" smtClean="0"/>
-          </a:p>
-        </p:txBody>
-      </p:sp>
-    </p:spTree>
-    <p:extLst>
-      <p:ext uri="{BB962C8B-B14F-4D97-AF65-F5344CB8AC3E}">
-        <p14:creationId xmlns:p14="http://schemas.microsoft.com/office/powerpoint/2010/main" val="699181284"/>
-      </p:ext>
-    </p:extLst>
-  </p:cSld>
-  <p:clrMapOvr>
-    <a:masterClrMapping/>
-  </p:clrMapOvr>
-  <p:timing>
-    <p:tnLst>
-      <p:par>
-        <p:cTn id="1" dur="indefinite" restart="never" nodeType="tmRoot"/>
-      </p:par>
-    </p:tnLst>
-  </p:timing>
-</p:sld>
-</file>
-
-<file path=ppt/slides/slide25.xml><?xml version="1.0" encoding="utf-8"?>
-<p:sld xmlns:a="http://schemas.openxmlformats.org/drawingml/2006/main" xmlns:r="http://schemas.openxmlformats.org/officeDocument/2006/relationships" xmlns:p="http://schemas.openxmlformats.org/presentationml/2006/main">
-  <p:cSld>
-    <p:spTree>
-      <p:nvGrpSpPr>
-        <p:cNvPr id="1" name=""/>
-        <p:cNvGrpSpPr/>
-        <p:nvPr/>
-      </p:nvGrpSpPr>
-      <p:grpSpPr>
-        <a:xfrm>
-          <a:off x="0" y="0"/>
-          <a:ext cx="0" cy="0"/>
-          <a:chOff x="0" y="0"/>
-          <a:chExt cx="0" cy="0"/>
-        </a:xfrm>
-      </p:grpSpPr>
-      <p:sp>
-        <p:nvSpPr>
-          <p:cNvPr id="2" name="Title 1"/>
-          <p:cNvSpPr>
-            <a:spLocks noGrp="1"/>
-          </p:cNvSpPr>
-          <p:nvPr>
-            <p:ph type="title"/>
-          </p:nvPr>
-        </p:nvSpPr>
-        <p:spPr/>
-        <p:txBody>
-          <a:bodyPr/>
-          <a:lstStyle/>
-          <a:p>
-            <a:r>
-              <a:rPr lang="en-US" dirty="0" smtClean="0"/>
-              <a:t>Potential Solution</a:t>
-            </a:r>
-            <a:endParaRPr lang="en-US" dirty="0"/>
-          </a:p>
-        </p:txBody>
-      </p:sp>
-      <p:pic>
-        <p:nvPicPr>
-          <p:cNvPr id="11" name="Content Placeholder 10"/>
-          <p:cNvPicPr>
-            <a:picLocks noGrp="1" noChangeAspect="1"/>
-          </p:cNvPicPr>
-          <p:nvPr>
-            <p:ph idx="1"/>
-          </p:nvPr>
-        </p:nvPicPr>
-        <p:blipFill>
-          <a:blip r:embed="rId2"/>
-          <a:stretch>
-            <a:fillRect/>
-          </a:stretch>
-        </p:blipFill>
-        <p:spPr>
-          <a:xfrm>
-            <a:off x="3873646" y="1466397"/>
-            <a:ext cx="3049668" cy="5270246"/>
-          </a:xfrm>
-          <a:prstGeom prst="rect">
-            <a:avLst/>
-          </a:prstGeom>
-        </p:spPr>
-      </p:pic>
-    </p:spTree>
-    <p:extLst>
-      <p:ext uri="{BB962C8B-B14F-4D97-AF65-F5344CB8AC3E}">
-        <p14:creationId xmlns:p14="http://schemas.microsoft.com/office/powerpoint/2010/main" val="2726150810"/>
-      </p:ext>
-    </p:extLst>
-  </p:cSld>
-  <p:clrMapOvr>
-    <a:masterClrMapping/>
-  </p:clrMapOvr>
-  <p:timing>
-    <p:tnLst>
-      <p:par>
-        <p:cTn id="1" dur="indefinite" restart="never" nodeType="tmRoot"/>
-      </p:par>
-    </p:tnLst>
-  </p:timing>
-</p:sld>
-</file>
-
-<file path=ppt/slides/slide26.xml><?xml version="1.0" encoding="utf-8"?>
-<p:sld xmlns:a="http://schemas.openxmlformats.org/drawingml/2006/main" xmlns:r="http://schemas.openxmlformats.org/officeDocument/2006/relationships" xmlns:p="http://schemas.openxmlformats.org/presentationml/2006/main">
-  <p:cSld>
-    <p:spTree>
-      <p:nvGrpSpPr>
-        <p:cNvPr id="1" name=""/>
-        <p:cNvGrpSpPr/>
-        <p:nvPr/>
-      </p:nvGrpSpPr>
-      <p:grpSpPr>
-        <a:xfrm>
-          <a:off x="0" y="0"/>
-          <a:ext cx="0" cy="0"/>
-          <a:chOff x="0" y="0"/>
-          <a:chExt cx="0" cy="0"/>
-        </a:xfrm>
-      </p:grpSpPr>
-      <p:sp>
-        <p:nvSpPr>
-          <p:cNvPr id="2" name="Title 1"/>
-          <p:cNvSpPr>
-            <a:spLocks noGrp="1"/>
-          </p:cNvSpPr>
-          <p:nvPr>
-            <p:ph type="title"/>
-          </p:nvPr>
-        </p:nvSpPr>
-        <p:spPr/>
-        <p:txBody>
-          <a:bodyPr/>
-          <a:lstStyle/>
-          <a:p>
-            <a:r>
-              <a:rPr lang="en-US" dirty="0" smtClean="0"/>
-              <a:t>The Scenario – Data Duplication	</a:t>
-            </a:r>
-            <a:endParaRPr lang="en-US" dirty="0"/>
-          </a:p>
-        </p:txBody>
-      </p:sp>
-      <p:pic>
-        <p:nvPicPr>
-          <p:cNvPr id="7" name="Content Placeholder 6"/>
-          <p:cNvPicPr>
-            <a:picLocks noGrp="1" noChangeAspect="1"/>
-          </p:cNvPicPr>
-          <p:nvPr>
-            <p:ph idx="1"/>
-          </p:nvPr>
-        </p:nvPicPr>
-        <p:blipFill>
-          <a:blip r:embed="rId2"/>
-          <a:stretch>
-            <a:fillRect/>
-          </a:stretch>
-        </p:blipFill>
-        <p:spPr>
-          <a:xfrm>
-            <a:off x="3165146" y="1690688"/>
-            <a:ext cx="4528359" cy="5004310"/>
-          </a:xfrm>
-          <a:prstGeom prst="rect">
-            <a:avLst/>
-          </a:prstGeom>
-        </p:spPr>
-      </p:pic>
-    </p:spTree>
-    <p:extLst>
-      <p:ext uri="{BB962C8B-B14F-4D97-AF65-F5344CB8AC3E}">
-        <p14:creationId xmlns:p14="http://schemas.microsoft.com/office/powerpoint/2010/main" val="1129491837"/>
-      </p:ext>
-    </p:extLst>
-  </p:cSld>
-  <p:clrMapOvr>
-    <a:masterClrMapping/>
-  </p:clrMapOvr>
-  <p:timing>
-    <p:tnLst>
-      <p:par>
-        <p:cTn id="1" dur="indefinite" restart="never" nodeType="tmRoot"/>
-      </p:par>
-    </p:tnLst>
-  </p:timing>
-</p:sld>
-</file>
-
-<file path=ppt/slides/slide27.xml><?xml version="1.0" encoding="utf-8"?>
-<p:sld xmlns:a="http://schemas.openxmlformats.org/drawingml/2006/main" xmlns:r="http://schemas.openxmlformats.org/officeDocument/2006/relationships" xmlns:p="http://schemas.openxmlformats.org/presentationml/2006/main">
-  <p:cSld>
-    <p:spTree>
-      <p:nvGrpSpPr>
-        <p:cNvPr id="1" name=""/>
-        <p:cNvGrpSpPr/>
-        <p:nvPr/>
-      </p:nvGrpSpPr>
-      <p:grpSpPr>
-        <a:xfrm>
-          <a:off x="0" y="0"/>
-          <a:ext cx="0" cy="0"/>
-          <a:chOff x="0" y="0"/>
-          <a:chExt cx="0" cy="0"/>
-        </a:xfrm>
-      </p:grpSpPr>
-      <p:sp>
-        <p:nvSpPr>
-          <p:cNvPr id="2" name="Title 1"/>
-          <p:cNvSpPr>
-            <a:spLocks noGrp="1"/>
-          </p:cNvSpPr>
-          <p:nvPr>
-            <p:ph type="title"/>
-          </p:nvPr>
-        </p:nvSpPr>
-        <p:spPr/>
-        <p:txBody>
-          <a:bodyPr/>
-          <a:lstStyle/>
-          <a:p>
-            <a:r>
-              <a:rPr lang="en-US" dirty="0" smtClean="0"/>
-              <a:t>Problems</a:t>
-            </a:r>
-            <a:endParaRPr lang="en-US" dirty="0"/>
-          </a:p>
-        </p:txBody>
-      </p:sp>
-      <p:sp>
-        <p:nvSpPr>
-          <p:cNvPr id="3" name="Content Placeholder 2"/>
-          <p:cNvSpPr>
-            <a:spLocks noGrp="1"/>
-          </p:cNvSpPr>
-          <p:nvPr>
-            <p:ph idx="1"/>
-          </p:nvPr>
-        </p:nvSpPr>
-        <p:spPr>
-          <a:xfrm>
-            <a:off x="838200" y="1690688"/>
-            <a:ext cx="10515600" cy="4486275"/>
-          </a:xfrm>
-        </p:spPr>
-        <p:txBody>
-          <a:bodyPr>
-            <a:normAutofit/>
-          </a:bodyPr>
-          <a:lstStyle/>
-          <a:p>
-            <a:r>
-              <a:rPr lang="en-US" dirty="0" smtClean="0"/>
-              <a:t>Replication usually includes all data.</a:t>
-            </a:r>
-          </a:p>
-          <a:p>
-            <a:r>
-              <a:rPr lang="en-US" dirty="0" smtClean="0"/>
-              <a:t>Replication Needs same Table Relations.</a:t>
-            </a:r>
-          </a:p>
-          <a:p>
-            <a:r>
-              <a:rPr lang="en-US" dirty="0" smtClean="0"/>
-              <a:t>Fourth Normal means Joins and Knowledge</a:t>
-            </a:r>
-          </a:p>
-          <a:p>
-            <a:r>
-              <a:rPr lang="en-US" dirty="0" smtClean="0"/>
-              <a:t>Batch Jobs</a:t>
-            </a:r>
-          </a:p>
-          <a:p>
-            <a:r>
-              <a:rPr lang="en-US" dirty="0" smtClean="0"/>
-              <a:t>Future Reporting</a:t>
-            </a:r>
-          </a:p>
-          <a:p>
-            <a:endParaRPr lang="en-US" dirty="0" smtClean="0"/>
-          </a:p>
-        </p:txBody>
-      </p:sp>
-    </p:spTree>
-    <p:extLst>
-      <p:ext uri="{BB962C8B-B14F-4D97-AF65-F5344CB8AC3E}">
-        <p14:creationId xmlns:p14="http://schemas.microsoft.com/office/powerpoint/2010/main" val="2328945987"/>
-      </p:ext>
-    </p:extLst>
-  </p:cSld>
-  <p:clrMapOvr>
-    <a:masterClrMapping/>
-  </p:clrMapOvr>
-  <p:timing>
-    <p:tnLst>
-      <p:par>
-        <p:cTn id="1" dur="indefinite" restart="never" nodeType="tmRoot"/>
-      </p:par>
-    </p:tnLst>
-  </p:timing>
-</p:sld>
-</file>
-
-<file path=ppt/slides/slide28.xml><?xml version="1.0" encoding="utf-8"?>
-<p:sld xmlns:a="http://schemas.openxmlformats.org/drawingml/2006/main" xmlns:r="http://schemas.openxmlformats.org/officeDocument/2006/relationships" xmlns:p="http://schemas.openxmlformats.org/presentationml/2006/main">
-  <p:cSld>
-    <p:spTree>
-      <p:nvGrpSpPr>
-        <p:cNvPr id="1" name=""/>
-        <p:cNvGrpSpPr/>
-        <p:nvPr/>
-      </p:nvGrpSpPr>
-      <p:grpSpPr>
-        <a:xfrm>
-          <a:off x="0" y="0"/>
-          <a:ext cx="0" cy="0"/>
-          <a:chOff x="0" y="0"/>
-          <a:chExt cx="0" cy="0"/>
-        </a:xfrm>
-      </p:grpSpPr>
-      <p:sp>
-        <p:nvSpPr>
-          <p:cNvPr id="2" name="Title 1"/>
-          <p:cNvSpPr>
-            <a:spLocks noGrp="1"/>
-          </p:cNvSpPr>
-          <p:nvPr>
-            <p:ph type="title"/>
-          </p:nvPr>
-        </p:nvSpPr>
-        <p:spPr/>
-        <p:txBody>
-          <a:bodyPr/>
-          <a:lstStyle/>
-          <a:p>
-            <a:r>
-              <a:rPr lang="en-US" dirty="0" smtClean="0"/>
-              <a:t>Potential Solution</a:t>
-            </a:r>
-            <a:endParaRPr lang="en-US" dirty="0"/>
-          </a:p>
-        </p:txBody>
-      </p:sp>
-      <p:pic>
-        <p:nvPicPr>
-          <p:cNvPr id="6" name="Content Placeholder 5"/>
-          <p:cNvPicPr>
-            <a:picLocks noGrp="1" noChangeAspect="1"/>
-          </p:cNvPicPr>
-          <p:nvPr>
-            <p:ph idx="1"/>
-          </p:nvPr>
-        </p:nvPicPr>
-        <p:blipFill>
-          <a:blip r:embed="rId2"/>
-          <a:stretch>
-            <a:fillRect/>
-          </a:stretch>
-        </p:blipFill>
-        <p:spPr>
-          <a:xfrm>
-            <a:off x="2686489" y="1690688"/>
-            <a:ext cx="4223194" cy="5117686"/>
-          </a:xfrm>
-          <a:prstGeom prst="rect">
-            <a:avLst/>
-          </a:prstGeom>
-        </p:spPr>
-      </p:pic>
-    </p:spTree>
-    <p:extLst>
-      <p:ext uri="{BB962C8B-B14F-4D97-AF65-F5344CB8AC3E}">
-        <p14:creationId xmlns:p14="http://schemas.microsoft.com/office/powerpoint/2010/main" val="2930193326"/>
-      </p:ext>
-    </p:extLst>
-  </p:cSld>
-  <p:clrMapOvr>
-    <a:masterClrMapping/>
-  </p:clrMapOvr>
-  <p:timing>
-    <p:tnLst>
-      <p:par>
-        <p:cTn id="1" dur="indefinite" restart="never" nodeType="tmRoot"/>
-      </p:par>
-    </p:tnLst>
-  </p:timing>
-</p:sld>
-</file>
-
-<file path=ppt/slides/slide29.xml><?xml version="1.0" encoding="utf-8"?>
-<p:sld xmlns:a="http://schemas.openxmlformats.org/drawingml/2006/main" xmlns:r="http://schemas.openxmlformats.org/officeDocument/2006/relationships" xmlns:p="http://schemas.openxmlformats.org/presentationml/2006/main">
-  <p:cSld>
-    <p:spTree>
-      <p:nvGrpSpPr>
-        <p:cNvPr id="1" name=""/>
-        <p:cNvGrpSpPr/>
-        <p:nvPr/>
-      </p:nvGrpSpPr>
-      <p:grpSpPr>
-        <a:xfrm>
-          <a:off x="0" y="0"/>
-          <a:ext cx="0" cy="0"/>
-          <a:chOff x="0" y="0"/>
-          <a:chExt cx="0" cy="0"/>
-        </a:xfrm>
-      </p:grpSpPr>
-      <p:sp>
-        <p:nvSpPr>
-          <p:cNvPr id="2" name="Title 1"/>
-          <p:cNvSpPr>
-            <a:spLocks noGrp="1"/>
-          </p:cNvSpPr>
-          <p:nvPr>
-            <p:ph type="title"/>
-          </p:nvPr>
-        </p:nvSpPr>
-        <p:spPr/>
-        <p:txBody>
-          <a:bodyPr/>
-          <a:lstStyle/>
-          <a:p>
-            <a:r>
-              <a:rPr lang="en-US" dirty="0" smtClean="0"/>
-              <a:t>The Scenario – Blocking Process</a:t>
-            </a:r>
-            <a:endParaRPr lang="en-US" dirty="0"/>
-          </a:p>
-        </p:txBody>
-      </p:sp>
-      <p:pic>
-        <p:nvPicPr>
-          <p:cNvPr id="4" name="Content Placeholder 3"/>
-          <p:cNvPicPr>
-            <a:picLocks noGrp="1" noChangeAspect="1"/>
-          </p:cNvPicPr>
-          <p:nvPr>
-            <p:ph idx="1"/>
-          </p:nvPr>
-        </p:nvPicPr>
-        <p:blipFill>
-          <a:blip r:embed="rId2"/>
-          <a:stretch>
-            <a:fillRect/>
-          </a:stretch>
-        </p:blipFill>
-        <p:spPr>
-          <a:xfrm>
-            <a:off x="3060020" y="1841953"/>
-            <a:ext cx="5484131" cy="4351338"/>
-          </a:xfrm>
-          <a:prstGeom prst="rect">
-            <a:avLst/>
-          </a:prstGeom>
-        </p:spPr>
-      </p:pic>
-    </p:spTree>
-    <p:extLst>
-      <p:ext uri="{BB962C8B-B14F-4D97-AF65-F5344CB8AC3E}">
-        <p14:creationId xmlns:p14="http://schemas.microsoft.com/office/powerpoint/2010/main" val="3335941667"/>
-      </p:ext>
-    </p:extLst>
-  </p:cSld>
-  <p:clrMapOvr>
-    <a:masterClrMapping/>
-  </p:clrMapOvr>
-  <p:timing>
-    <p:tnLst>
-      <p:par>
-        <p:cTn id="1" dur="indefinite" restart="never" nodeType="tmRoot"/>
-      </p:par>
-    </p:tnLst>
-  </p:timing>
-</p:sld>
-</file>
-
-<file path=ppt/slides/slide3.xml><?xml version="1.0" encoding="utf-8"?>
-<p:sld xmlns:a="http://schemas.openxmlformats.org/drawingml/2006/main" xmlns:r="http://schemas.openxmlformats.org/officeDocument/2006/relationships" xmlns:p="http://schemas.openxmlformats.org/presentationml/2006/main">
-  <p:cSld>
-    <p:spTree>
-      <p:nvGrpSpPr>
-        <p:cNvPr id="1" name=""/>
-        <p:cNvGrpSpPr/>
-        <p:nvPr/>
-      </p:nvGrpSpPr>
-      <p:grpSpPr>
-        <a:xfrm>
-          <a:off x="0" y="0"/>
-          <a:ext cx="0" cy="0"/>
-          <a:chOff x="0" y="0"/>
-          <a:chExt cx="0" cy="0"/>
-        </a:xfrm>
-      </p:grpSpPr>
-      <p:sp>
-        <p:nvSpPr>
-          <p:cNvPr id="2" name="Title 1"/>
-          <p:cNvSpPr>
-            <a:spLocks noGrp="1"/>
-          </p:cNvSpPr>
-          <p:nvPr>
-            <p:ph type="title"/>
-          </p:nvPr>
-        </p:nvSpPr>
-        <p:spPr/>
-        <p:txBody>
-          <a:bodyPr/>
-          <a:lstStyle/>
-          <a:p>
-            <a:r>
-              <a:rPr lang="en-US" dirty="0" smtClean="0"/>
-              <a:t>Al Zaudtke</a:t>
-            </a:r>
-            <a:endParaRPr lang="en-US" dirty="0"/>
-          </a:p>
-        </p:txBody>
-      </p:sp>
-      <p:sp>
-        <p:nvSpPr>
-          <p:cNvPr id="3" name="Content Placeholder 2"/>
-          <p:cNvSpPr>
-            <a:spLocks noGrp="1"/>
-          </p:cNvSpPr>
-          <p:nvPr>
-            <p:ph idx="1"/>
-          </p:nvPr>
-        </p:nvSpPr>
-        <p:spPr/>
-        <p:txBody>
-          <a:bodyPr/>
-          <a:lstStyle/>
-          <a:p>
-            <a:r>
-              <a:rPr lang="en-US" dirty="0" smtClean="0"/>
-              <a:t>Architect at J. J. Keller &amp; Associates, Inc.</a:t>
-            </a:r>
-          </a:p>
-          <a:p>
-            <a:r>
-              <a:rPr lang="en-US" dirty="0" smtClean="0"/>
-              <a:t>13 Years building enterprise Web applications</a:t>
-            </a:r>
-          </a:p>
-          <a:p>
-            <a:r>
-              <a:rPr lang="en-US" dirty="0" smtClean="0"/>
-              <a:t>Android and </a:t>
-            </a:r>
-            <a:r>
-              <a:rPr lang="en-US" dirty="0" err="1" smtClean="0"/>
-              <a:t>iOS</a:t>
-            </a:r>
-            <a:r>
-              <a:rPr lang="en-US" dirty="0" smtClean="0"/>
-              <a:t> </a:t>
-            </a:r>
-            <a:r>
-              <a:rPr lang="en-US" dirty="0" err="1" smtClean="0"/>
-              <a:t>Develoment</a:t>
-            </a:r>
-            <a:endParaRPr lang="en-US" dirty="0" smtClean="0"/>
-          </a:p>
-          <a:p>
-            <a:r>
-              <a:rPr lang="en-US" dirty="0" smtClean="0"/>
-              <a:t>Legacy application migration</a:t>
-            </a:r>
-            <a:endParaRPr lang="en-US" dirty="0" smtClean="0"/>
-          </a:p>
-          <a:p>
-            <a:pPr marL="0" indent="0">
-              <a:buNone/>
-            </a:pPr>
-            <a:endParaRPr lang="en-US" dirty="0" smtClean="0"/>
-          </a:p>
-        </p:txBody>
-      </p:sp>
-      <p:pic>
-        <p:nvPicPr>
-          <p:cNvPr id="4" name="Picture 3"/>
-          <p:cNvPicPr>
-            <a:picLocks noChangeAspect="1"/>
-          </p:cNvPicPr>
-          <p:nvPr/>
-        </p:nvPicPr>
-        <p:blipFill>
-          <a:blip r:embed="rId2"/>
-          <a:stretch>
-            <a:fillRect/>
-          </a:stretch>
-        </p:blipFill>
-        <p:spPr>
-          <a:xfrm>
-            <a:off x="10796587" y="6176963"/>
-            <a:ext cx="1114425" cy="495300"/>
-          </a:xfrm>
-          <a:prstGeom prst="rect">
-            <a:avLst/>
-          </a:prstGeom>
-        </p:spPr>
-      </p:pic>
-    </p:spTree>
-    <p:extLst>
-      <p:ext uri="{BB962C8B-B14F-4D97-AF65-F5344CB8AC3E}">
-        <p14:creationId xmlns:p14="http://schemas.microsoft.com/office/powerpoint/2010/main" val="2963992924"/>
-      </p:ext>
-    </p:extLst>
-  </p:cSld>
-  <p:clrMapOvr>
-    <a:masterClrMapping/>
-  </p:clrMapOvr>
-  <p:timing>
-    <p:tnLst>
-      <p:par>
-        <p:cTn id="1" dur="indefinite" restart="never" nodeType="tmRoot"/>
-      </p:par>
-    </p:tnLst>
-  </p:timing>
-</p:sld>
-</file>
-
 <file path=ppt/slides/slide30.xml><?xml version="1.0" encoding="utf-8"?>
 <p:sld xmlns:a="http://schemas.openxmlformats.org/drawingml/2006/main" xmlns:r="http://schemas.openxmlformats.org/officeDocument/2006/relationships" xmlns:p="http://schemas.openxmlformats.org/presentationml/2006/main">
   <p:cSld>
@@ -6392,64 +5876,42 @@
           <a:p>
             <a:r>
               <a:rPr lang="en-US" dirty="0" smtClean="0"/>
-              <a:t>Problems</a:t>
-            </a:r>
-            <a:endParaRPr lang="en-US" dirty="0"/>
-          </a:p>
-        </p:txBody>
-      </p:sp>
-      <p:sp>
-        <p:nvSpPr>
-          <p:cNvPr id="3" name="Content Placeholder 2"/>
-          <p:cNvSpPr>
-            <a:spLocks noGrp="1"/>
-          </p:cNvSpPr>
+              <a:t>Potential Solution</a:t>
+            </a:r>
+            <a:endParaRPr lang="en-US" dirty="0"/>
+          </a:p>
+        </p:txBody>
+      </p:sp>
+      <p:pic>
+        <p:nvPicPr>
+          <p:cNvPr id="4" name="Content Placeholder 3"/>
+          <p:cNvPicPr>
+            <a:picLocks noGrp="1" noChangeAspect="1"/>
+          </p:cNvPicPr>
           <p:nvPr>
             <p:ph idx="1"/>
           </p:nvPr>
-        </p:nvSpPr>
-        <p:spPr/>
-        <p:txBody>
-          <a:bodyPr>
-            <a:normAutofit/>
-          </a:bodyPr>
-          <a:lstStyle/>
-          <a:p>
-            <a:r>
-              <a:rPr lang="en-US" dirty="0" smtClean="0"/>
-              <a:t>In Process means the customer waits for all to complete.</a:t>
-            </a:r>
-          </a:p>
-          <a:p>
-            <a:r>
-              <a:rPr lang="en-US" dirty="0" smtClean="0"/>
-              <a:t>Thought of as a Transaction, but it really isn’t.</a:t>
-            </a:r>
-          </a:p>
-          <a:p>
-            <a:r>
-              <a:rPr lang="en-US" dirty="0" smtClean="0"/>
-              <a:t>Failure other than Database insert, shouldn’t break the process.</a:t>
-            </a:r>
-          </a:p>
-          <a:p>
-            <a:r>
-              <a:rPr lang="en-US" dirty="0" smtClean="0"/>
-              <a:t>Asynchronous calls help the UI, but not the process.</a:t>
-            </a:r>
-          </a:p>
-          <a:p>
-            <a:r>
-              <a:rPr lang="en-US" dirty="0" smtClean="0"/>
-              <a:t>Your process is now dependent on an external system.</a:t>
-            </a:r>
-          </a:p>
-        </p:txBody>
-      </p:sp>
+        </p:nvPicPr>
+        <p:blipFill>
+          <a:blip r:embed="rId2"/>
+          <a:stretch>
+            <a:fillRect/>
+          </a:stretch>
+        </p:blipFill>
+        <p:spPr>
+          <a:xfrm>
+            <a:off x="3029037" y="1563466"/>
+            <a:ext cx="4667825" cy="5114683"/>
+          </a:xfrm>
+          <a:prstGeom prst="rect">
+            <a:avLst/>
+          </a:prstGeom>
+        </p:spPr>
+      </p:pic>
     </p:spTree>
     <p:extLst>
       <p:ext uri="{BB962C8B-B14F-4D97-AF65-F5344CB8AC3E}">
-        <p14:creationId xmlns:p14="http://schemas.microsoft.com/office/powerpoint/2010/main" val="1636338860"/>
+        <p14:creationId xmlns:p14="http://schemas.microsoft.com/office/powerpoint/2010/main" val="1281764627"/>
       </p:ext>
     </p:extLst>
   </p:cSld>
@@ -6500,42 +5962,57 @@
           <a:p>
             <a:r>
               <a:rPr lang="en-US" dirty="0" smtClean="0"/>
-              <a:t>Potential Solution</a:t>
-            </a:r>
-            <a:endParaRPr lang="en-US" dirty="0"/>
-          </a:p>
-        </p:txBody>
-      </p:sp>
-      <p:pic>
-        <p:nvPicPr>
-          <p:cNvPr id="4" name="Content Placeholder 3"/>
-          <p:cNvPicPr>
-            <a:picLocks noGrp="1" noChangeAspect="1"/>
-          </p:cNvPicPr>
+              <a:t>Closing Thoughts</a:t>
+            </a:r>
+            <a:endParaRPr lang="en-US" dirty="0"/>
+          </a:p>
+        </p:txBody>
+      </p:sp>
+      <p:sp>
+        <p:nvSpPr>
+          <p:cNvPr id="3" name="Content Placeholder 2"/>
+          <p:cNvSpPr>
+            <a:spLocks noGrp="1"/>
+          </p:cNvSpPr>
           <p:nvPr>
             <p:ph idx="1"/>
           </p:nvPr>
-        </p:nvPicPr>
-        <p:blipFill>
-          <a:blip r:embed="rId2"/>
-          <a:stretch>
-            <a:fillRect/>
-          </a:stretch>
-        </p:blipFill>
-        <p:spPr>
-          <a:xfrm>
-            <a:off x="3365755" y="1690688"/>
-            <a:ext cx="3345146" cy="5102908"/>
-          </a:xfrm>
-          <a:prstGeom prst="rect">
-            <a:avLst/>
-          </a:prstGeom>
-        </p:spPr>
-      </p:pic>
+        </p:nvSpPr>
+        <p:spPr/>
+        <p:txBody>
+          <a:bodyPr/>
+          <a:lstStyle/>
+          <a:p>
+            <a:r>
+              <a:rPr lang="en-US" dirty="0" smtClean="0"/>
+              <a:t>A Queue can handle multiple types of messages.  Be careful.</a:t>
+            </a:r>
+          </a:p>
+          <a:p>
+            <a:r>
+              <a:rPr lang="en-US" dirty="0" smtClean="0"/>
+              <a:t>Not the solution to every problem.</a:t>
+            </a:r>
+          </a:p>
+          <a:p>
+            <a:r>
+              <a:rPr lang="en-US" dirty="0" smtClean="0"/>
+              <a:t>At least consider messaging during design.</a:t>
+            </a:r>
+          </a:p>
+          <a:p>
+            <a:r>
+              <a:rPr lang="en-US" dirty="0" smtClean="0"/>
+              <a:t>Research and try it out!</a:t>
+            </a:r>
+            <a:endParaRPr lang="en-US" dirty="0"/>
+          </a:p>
+        </p:txBody>
+      </p:sp>
     </p:spTree>
     <p:extLst>
       <p:ext uri="{BB962C8B-B14F-4D97-AF65-F5344CB8AC3E}">
-        <p14:creationId xmlns:p14="http://schemas.microsoft.com/office/powerpoint/2010/main" val="3295330895"/>
+        <p14:creationId xmlns:p14="http://schemas.microsoft.com/office/powerpoint/2010/main" val="3073448610"/>
       </p:ext>
     </p:extLst>
   </p:cSld>
@@ -6586,7 +6063,7 @@
           <a:p>
             <a:r>
               <a:rPr lang="en-US" dirty="0" smtClean="0"/>
-              <a:t>Closing Thoughts</a:t>
+              <a:t>Thank you for attending</a:t>
             </a:r>
             <a:endParaRPr lang="en-US" dirty="0"/>
           </a:p>
@@ -6609,34 +6086,118 @@
           <a:p>
             <a:r>
               <a:rPr lang="en-US" dirty="0" smtClean="0"/>
-              <a:t>A Queue can handle multiple types of messages.  Be careful.</a:t>
-            </a:r>
-          </a:p>
-          <a:p>
-            <a:r>
-              <a:rPr lang="en-US" dirty="0" smtClean="0"/>
-              <a:t>Don’t overuse.</a:t>
-            </a:r>
-          </a:p>
-          <a:p>
-            <a:r>
-              <a:rPr lang="en-US" dirty="0" smtClean="0"/>
-              <a:t>At least consider when designing various parts of a system.</a:t>
-            </a:r>
-          </a:p>
-          <a:p>
-            <a:r>
-              <a:rPr lang="en-US" dirty="0" smtClean="0"/>
-              <a:t>Research and try it out!</a:t>
-            </a:r>
-            <a:endParaRPr lang="en-US" dirty="0"/>
-          </a:p>
-        </p:txBody>
-      </p:sp>
+              <a:t>Contact </a:t>
+            </a:r>
+            <a:r>
+              <a:rPr lang="en-US" dirty="0"/>
+              <a:t>Info</a:t>
+            </a:r>
+          </a:p>
+          <a:p>
+            <a:pPr lvl="1"/>
+            <a:r>
+              <a:rPr lang="en-US" dirty="0">
+                <a:solidFill>
+                  <a:schemeClr val="accent5"/>
+                </a:solidFill>
+              </a:rPr>
+              <a:t>@</a:t>
+            </a:r>
+            <a:r>
+              <a:rPr lang="en-US" dirty="0" err="1">
+                <a:solidFill>
+                  <a:schemeClr val="accent5"/>
+                </a:solidFill>
+              </a:rPr>
+              <a:t>alzaudtke</a:t>
+            </a:r>
+            <a:endParaRPr lang="en-US" dirty="0">
+              <a:solidFill>
+                <a:schemeClr val="accent5"/>
+              </a:solidFill>
+            </a:endParaRPr>
+          </a:p>
+          <a:p>
+            <a:pPr lvl="1"/>
+            <a:r>
+              <a:rPr lang="en-US" dirty="0">
+                <a:hlinkClick r:id="rId2"/>
+              </a:rPr>
+              <a:t>https://github.com/Zaudtke</a:t>
+            </a:r>
+            <a:endParaRPr lang="en-US" dirty="0"/>
+          </a:p>
+          <a:p>
+            <a:pPr lvl="1"/>
+            <a:r>
+              <a:rPr lang="en-US" dirty="0">
+                <a:hlinkClick r:id="rId3"/>
+              </a:rPr>
+              <a:t>http://</a:t>
+            </a:r>
+            <a:r>
+              <a:rPr lang="en-US" dirty="0" smtClean="0">
+                <a:hlinkClick r:id="rId3"/>
+              </a:rPr>
+              <a:t>zaudtke.com</a:t>
+            </a:r>
+            <a:endParaRPr lang="en-US" dirty="0" smtClean="0"/>
+          </a:p>
+          <a:p>
+            <a:r>
+              <a:rPr lang="en-US" dirty="0" smtClean="0"/>
+              <a:t>Like a Marvel Movie, stay through the credits </a:t>
+            </a:r>
+          </a:p>
+          <a:p>
+            <a:r>
+              <a:rPr lang="en-US" dirty="0" smtClean="0"/>
+              <a:t>Questions</a:t>
+            </a:r>
+          </a:p>
+          <a:p>
+            <a:r>
+              <a:rPr lang="en-US" dirty="0" smtClean="0"/>
+              <a:t>…</a:t>
+            </a:r>
+            <a:endParaRPr lang="en-US" dirty="0"/>
+          </a:p>
+          <a:p>
+            <a:endParaRPr lang="en-US" dirty="0" smtClean="0"/>
+          </a:p>
+        </p:txBody>
+      </p:sp>
+      <p:pic>
+        <p:nvPicPr>
+          <p:cNvPr id="4" name="Picture 3"/>
+          <p:cNvPicPr>
+            <a:picLocks noChangeAspect="1"/>
+          </p:cNvPicPr>
+          <p:nvPr/>
+        </p:nvPicPr>
+        <p:blipFill>
+          <a:blip r:embed="rId4"/>
+          <a:stretch>
+            <a:fillRect/>
+          </a:stretch>
+        </p:blipFill>
+        <p:spPr>
+          <a:xfrm>
+            <a:off x="1488779" y="4449550"/>
+            <a:ext cx="612428" cy="513852"/>
+          </a:xfrm>
+          <a:prstGeom prst="rect">
+            <a:avLst/>
+          </a:prstGeom>
+          <a:solidFill>
+            <a:schemeClr val="bg1"/>
+          </a:solidFill>
+        </p:spPr>
+      </p:pic>
     </p:spTree>
     <p:extLst>
       <p:ext uri="{BB962C8B-B14F-4D97-AF65-F5344CB8AC3E}">
-        <p14:creationId xmlns:p14="http://schemas.microsoft.com/office/powerpoint/2010/main" val="3073448610"/>
+        <p14:creationId xmlns:p14="http://schemas.microsoft.com/office/powerpoint/2010/main" val="138312343"/>
       </p:ext>
     </p:extLst>
   </p:cSld>
@@ -6685,196 +6246,6 @@
           <a:bodyPr/>
           <a:lstStyle/>
           <a:p>
-            <a:r>
-              <a:rPr lang="en-US" dirty="0" smtClean="0"/>
-              <a:t>Thank you for attending</a:t>
-            </a:r>
-            <a:endParaRPr lang="en-US" dirty="0"/>
-          </a:p>
-        </p:txBody>
-      </p:sp>
-      <p:sp>
-        <p:nvSpPr>
-          <p:cNvPr id="3" name="Content Placeholder 2"/>
-          <p:cNvSpPr>
-            <a:spLocks noGrp="1"/>
-          </p:cNvSpPr>
-          <p:nvPr>
-            <p:ph idx="1"/>
-          </p:nvPr>
-        </p:nvSpPr>
-        <p:spPr/>
-        <p:txBody>
-          <a:bodyPr/>
-          <a:lstStyle/>
-          <a:p>
-            <a:r>
-              <a:rPr lang="en-US" dirty="0" smtClean="0"/>
-              <a:t>Contact </a:t>
-            </a:r>
-            <a:r>
-              <a:rPr lang="en-US" dirty="0"/>
-              <a:t>Info</a:t>
-            </a:r>
-          </a:p>
-          <a:p>
-            <a:pPr lvl="1"/>
-            <a:r>
-              <a:rPr lang="en-US" dirty="0">
-                <a:solidFill>
-                  <a:schemeClr val="accent5"/>
-                </a:solidFill>
-              </a:rPr>
-              <a:t>@</a:t>
-            </a:r>
-            <a:r>
-              <a:rPr lang="en-US" dirty="0" err="1">
-                <a:solidFill>
-                  <a:schemeClr val="accent5"/>
-                </a:solidFill>
-              </a:rPr>
-              <a:t>alzaudtke</a:t>
-            </a:r>
-            <a:endParaRPr lang="en-US" dirty="0">
-              <a:solidFill>
-                <a:schemeClr val="accent5"/>
-              </a:solidFill>
-            </a:endParaRPr>
-          </a:p>
-          <a:p>
-            <a:pPr lvl="1"/>
-            <a:r>
-              <a:rPr lang="en-US" dirty="0">
-                <a:hlinkClick r:id="rId2"/>
-              </a:rPr>
-              <a:t>https://github.com/Zaudtke</a:t>
-            </a:r>
-            <a:endParaRPr lang="en-US" dirty="0"/>
-          </a:p>
-          <a:p>
-            <a:pPr lvl="1"/>
-            <a:r>
-              <a:rPr lang="en-US" dirty="0">
-                <a:hlinkClick r:id="rId3"/>
-              </a:rPr>
-              <a:t>http://</a:t>
-            </a:r>
-            <a:r>
-              <a:rPr lang="en-US" dirty="0" smtClean="0">
-                <a:hlinkClick r:id="rId3"/>
-              </a:rPr>
-              <a:t>zaudtke.com</a:t>
-            </a:r>
-            <a:endParaRPr lang="en-US" dirty="0" smtClean="0"/>
-          </a:p>
-          <a:p>
-            <a:r>
-              <a:rPr lang="en-US" dirty="0" smtClean="0"/>
-              <a:t>Like </a:t>
-            </a:r>
-            <a:r>
-              <a:rPr lang="en-US" dirty="0" smtClean="0"/>
-              <a:t>a Marvel Movie, stay through the credits </a:t>
-            </a:r>
-            <a:endParaRPr lang="en-US" dirty="0" smtClean="0"/>
-          </a:p>
-          <a:p>
-            <a:r>
-              <a:rPr lang="en-US" dirty="0" smtClean="0"/>
-              <a:t>Questions</a:t>
-            </a:r>
-          </a:p>
-          <a:p>
-            <a:r>
-              <a:rPr lang="en-US" dirty="0" smtClean="0"/>
-              <a:t>…</a:t>
-            </a:r>
-            <a:endParaRPr lang="en-US" dirty="0"/>
-          </a:p>
-          <a:p>
-            <a:endParaRPr lang="en-US" dirty="0" smtClean="0"/>
-          </a:p>
-        </p:txBody>
-      </p:sp>
-      <p:pic>
-        <p:nvPicPr>
-          <p:cNvPr id="4" name="Picture 3"/>
-          <p:cNvPicPr>
-            <a:picLocks noChangeAspect="1"/>
-          </p:cNvPicPr>
-          <p:nvPr/>
-        </p:nvPicPr>
-        <p:blipFill>
-          <a:blip r:embed="rId4"/>
-          <a:stretch>
-            <a:fillRect/>
-          </a:stretch>
-        </p:blipFill>
-        <p:spPr>
-          <a:xfrm>
-            <a:off x="7738504" y="3487442"/>
-            <a:ext cx="612428" cy="513852"/>
-          </a:xfrm>
-          <a:prstGeom prst="rect">
-            <a:avLst/>
-          </a:prstGeom>
-          <a:solidFill>
-            <a:schemeClr val="bg1"/>
-          </a:solidFill>
-        </p:spPr>
-      </p:pic>
-    </p:spTree>
-    <p:extLst>
-      <p:ext uri="{BB962C8B-B14F-4D97-AF65-F5344CB8AC3E}">
-        <p14:creationId xmlns:p14="http://schemas.microsoft.com/office/powerpoint/2010/main" val="138312343"/>
-      </p:ext>
-    </p:extLst>
-  </p:cSld>
-  <p:clrMapOvr>
-    <a:masterClrMapping/>
-  </p:clrMapOvr>
-  <p:timing>
-    <p:tnLst>
-      <p:par>
-        <p:cTn id="1" dur="indefinite" restart="never" nodeType="tmRoot"/>
-      </p:par>
-    </p:tnLst>
-  </p:timing>
-</p:sld>
-</file>
-
-<file path=ppt/slides/slide34.xml><?xml version="1.0" encoding="utf-8"?>
-<p:sld xmlns:a="http://schemas.openxmlformats.org/drawingml/2006/main" xmlns:r="http://schemas.openxmlformats.org/officeDocument/2006/relationships" xmlns:p="http://schemas.openxmlformats.org/presentationml/2006/main">
-  <p:cSld>
-    <p:spTree>
-      <p:nvGrpSpPr>
-        <p:cNvPr id="1" name=""/>
-        <p:cNvGrpSpPr/>
-        <p:nvPr/>
-      </p:nvGrpSpPr>
-      <p:grpSpPr>
-        <a:xfrm>
-          <a:off x="0" y="0"/>
-          <a:ext cx="0" cy="0"/>
-          <a:chOff x="0" y="0"/>
-          <a:chExt cx="0" cy="0"/>
-        </a:xfrm>
-      </p:grpSpPr>
-      <p:sp>
-        <p:nvSpPr>
-          <p:cNvPr id="2" name="Title 1"/>
-          <p:cNvSpPr>
-            <a:spLocks noGrp="1"/>
-          </p:cNvSpPr>
-          <p:nvPr>
-            <p:ph type="title"/>
-          </p:nvPr>
-        </p:nvSpPr>
-        <p:spPr/>
-        <p:txBody>
-          <a:bodyPr/>
-          <a:lstStyle/>
-          <a:p>
             <a:pPr algn="ctr"/>
             <a:r>
               <a:rPr lang="en-US" dirty="0" smtClean="0"/>
@@ -6895,7 +6266,7 @@
           </p:nvPr>
         </p:nvPicPr>
         <p:blipFill>
-          <a:blip r:embed="rId2">
+          <a:blip r:embed="rId3">
             <a:extLst>
               <a:ext uri="{28A0092B-C50C-407E-A947-70E740481C1C}">
                 <a14:useLocalDpi xmlns:a14="http://schemas.microsoft.com/office/drawing/2010/main" val="0"/>
@@ -6967,7 +6338,7 @@
           <a:p>
             <a:r>
               <a:rPr lang="en-US" dirty="0" smtClean="0"/>
-              <a:t>Before we begin.  The Buzzwords</a:t>
+              <a:t>The Buzzwords</a:t>
             </a:r>
             <a:endParaRPr lang="en-US" dirty="0"/>
           </a:p>
@@ -7118,19 +6489,7 @@
           <a:p>
             <a:r>
               <a:rPr lang="en-US" dirty="0" smtClean="0"/>
-              <a:t>What’s in a Message</a:t>
-            </a:r>
-          </a:p>
-          <a:p>
-            <a:r>
-              <a:rPr lang="en-US" dirty="0" smtClean="0"/>
               <a:t>Three commonly used patterns</a:t>
-            </a:r>
-          </a:p>
-          <a:p>
-            <a:r>
-              <a:rPr lang="en-US" dirty="0" smtClean="0"/>
-              <a:t>Scenarios where these can be applied</a:t>
             </a:r>
           </a:p>
           <a:p>
@@ -7224,31 +6583,59 @@
           <a:p>
             <a:r>
               <a:rPr lang="en-US" dirty="0" smtClean="0"/>
+              <a:t>Loose </a:t>
+            </a:r>
+            <a:r>
+              <a:rPr lang="en-US" dirty="0"/>
+              <a:t>Coupling</a:t>
+            </a:r>
+            <a:r>
+              <a:rPr lang="en-US" dirty="0" smtClean="0"/>
+              <a:t>*</a:t>
+            </a:r>
+          </a:p>
+          <a:p>
+            <a:r>
+              <a:rPr lang="en-US" dirty="0" smtClean="0"/>
+              <a:t>Performance</a:t>
+            </a:r>
+          </a:p>
+          <a:p>
+            <a:r>
+              <a:rPr lang="en-US" dirty="0" smtClean="0"/>
               <a:t>Scalability</a:t>
             </a:r>
           </a:p>
           <a:p>
             <a:r>
               <a:rPr lang="en-US" dirty="0" smtClean="0"/>
-              <a:t>Performance Gains</a:t>
-            </a:r>
-          </a:p>
-          <a:p>
-            <a:r>
-              <a:rPr lang="en-US" dirty="0" smtClean="0"/>
               <a:t>Reliability</a:t>
             </a:r>
           </a:p>
           <a:p>
-            <a:r>
-              <a:rPr lang="en-US" dirty="0" smtClean="0"/>
-              <a:t>Louse Coupling</a:t>
-            </a:r>
-          </a:p>
-          <a:p>
             <a:endParaRPr lang="en-US" dirty="0" smtClean="0"/>
           </a:p>
           <a:p>
+            <a:pPr marL="0" indent="0">
+              <a:buNone/>
+            </a:pPr>
+            <a:r>
+              <a:rPr lang="en-US" dirty="0" smtClean="0"/>
+              <a:t>* More of an enabler than distinct advantage.</a:t>
+            </a:r>
+          </a:p>
+          <a:p>
+            <a:pPr marL="0" indent="0">
+              <a:buNone/>
+            </a:pPr>
+            <a:r>
+              <a:rPr lang="en-US" dirty="0"/>
+              <a:t> </a:t>
+            </a:r>
+            <a:r>
+              <a:rPr lang="en-US" dirty="0" smtClean="0"/>
+              <a:t>  Definitely makes deployment more complex</a:t>
+            </a:r>
             <a:endParaRPr lang="en-US" dirty="0"/>
           </a:p>
         </p:txBody>
@@ -7307,7 +6694,7 @@
           <a:p>
             <a:r>
               <a:rPr lang="en-US" dirty="0" smtClean="0"/>
-              <a:t>Messages</a:t>
+              <a:t>Sidebar - Messages</a:t>
             </a:r>
             <a:endParaRPr lang="en-US" dirty="0"/>
           </a:p>
@@ -7342,7 +6729,27 @@
           <a:p>
             <a:r>
               <a:rPr lang="en-US" dirty="0" smtClean="0"/>
-              <a:t>Only Contain what is needed</a:t>
+              <a:t>Serialized objects</a:t>
+            </a:r>
+          </a:p>
+          <a:p>
+            <a:r>
+              <a:rPr lang="en-US" dirty="0" smtClean="0"/>
+              <a:t>Various Size limitations</a:t>
+            </a:r>
+          </a:p>
+          <a:p>
+            <a:pPr lvl="1"/>
+            <a:r>
+              <a:rPr lang="en-US" dirty="0" smtClean="0"/>
+              <a:t>Contain everything</a:t>
+            </a:r>
+          </a:p>
+          <a:p>
+            <a:pPr lvl="1"/>
+            <a:r>
+              <a:rPr lang="en-US" dirty="0" smtClean="0"/>
+              <a:t>Contain just enough (Id’s for example)</a:t>
             </a:r>
           </a:p>
           <a:p>
@@ -7410,7 +6817,7 @@
           <a:p>
             <a:r>
               <a:rPr lang="en-US" dirty="0" smtClean="0"/>
-              <a:t>Message Exchange Patterns*</a:t>
+              <a:t>Direct Message Pattern</a:t>
             </a:r>
             <a:endParaRPr lang="en-US" dirty="0"/>
           </a:p>
@@ -7433,51 +6840,41 @@
           <a:p>
             <a:r>
               <a:rPr lang="en-US" dirty="0" smtClean="0"/>
-              <a:t>Direct</a:t>
-            </a:r>
-          </a:p>
-          <a:p>
-            <a:r>
-              <a:rPr lang="en-US" dirty="0" smtClean="0"/>
-              <a:t>Fanout</a:t>
-            </a:r>
-          </a:p>
-          <a:p>
-            <a:r>
-              <a:rPr lang="en-US" dirty="0" smtClean="0"/>
-              <a:t>Topic</a:t>
-            </a:r>
-          </a:p>
-          <a:p>
-            <a:r>
-              <a:rPr lang="en-US" dirty="0" smtClean="0"/>
-              <a:t>Headers</a:t>
-            </a:r>
-          </a:p>
-          <a:p>
-            <a:endParaRPr lang="en-US" dirty="0"/>
-          </a:p>
-          <a:p>
-            <a:endParaRPr lang="en-US" dirty="0" smtClean="0"/>
-          </a:p>
-          <a:p>
-            <a:pPr marL="0" indent="0">
-              <a:buNone/>
-            </a:pPr>
-            <a:r>
-              <a:rPr lang="en-US" dirty="0" smtClean="0"/>
-              <a:t>* Terms based on AMQP Model from the RabbitMQ site.  May have different terminology on other Platforms.  Specifically Microsoft.</a:t>
-            </a:r>
-          </a:p>
-          <a:p>
-            <a:endParaRPr lang="en-US" dirty="0" smtClean="0"/>
+              <a:t>Message Sent to Specific Queue</a:t>
+            </a:r>
+          </a:p>
+          <a:p>
+            <a:r>
+              <a:rPr lang="en-US" dirty="0" smtClean="0"/>
+              <a:t>Typically a very targeted process</a:t>
+            </a:r>
+          </a:p>
+          <a:p>
+            <a:r>
+              <a:rPr lang="en-US" dirty="0" smtClean="0"/>
+              <a:t>Usually a </a:t>
+            </a:r>
+            <a:r>
+              <a:rPr lang="en-US" dirty="0" smtClean="0"/>
+              <a:t>Command </a:t>
+            </a:r>
+            <a:r>
+              <a:rPr lang="en-US" dirty="0" smtClean="0"/>
+              <a:t>Message</a:t>
+            </a:r>
+          </a:p>
+          <a:p>
+            <a:r>
+              <a:rPr lang="en-US" dirty="0" smtClean="0"/>
+              <a:t>Handler can be scaled</a:t>
+            </a:r>
           </a:p>
         </p:txBody>
       </p:sp>
     </p:spTree>
     <p:extLst>
       <p:ext uri="{BB962C8B-B14F-4D97-AF65-F5344CB8AC3E}">
-        <p14:creationId xmlns:p14="http://schemas.microsoft.com/office/powerpoint/2010/main" val="1514779334"/>
+        <p14:creationId xmlns:p14="http://schemas.microsoft.com/office/powerpoint/2010/main" val="80833112"/>
       </p:ext>
     </p:extLst>
   </p:cSld>
@@ -7527,10 +6924,9 @@
           <a:lstStyle/>
           <a:p>
             <a:r>
-              <a:rPr lang="en-US" dirty="0" smtClean="0"/>
-              <a:t>Direct Exchange	</a:t>
-            </a:r>
-            <a:endParaRPr lang="en-US" dirty="0"/>
+              <a:rPr lang="en-US" dirty="0"/>
+              <a:t>Direct Message Pattern</a:t>
+            </a:r>
           </a:p>
         </p:txBody>
       </p:sp>
@@ -7551,45 +6947,24 @@
           <a:p>
             <a:r>
               <a:rPr lang="en-US" dirty="0" smtClean="0"/>
-              <a:t>Messages delivered to queues based on routing key.</a:t>
-            </a:r>
-          </a:p>
-          <a:p>
-            <a:r>
-              <a:rPr lang="en-US" dirty="0" smtClean="0"/>
-              <a:t>Routing Key can be empty</a:t>
-            </a:r>
-          </a:p>
-          <a:p>
-            <a:r>
-              <a:rPr lang="en-US" dirty="0" smtClean="0"/>
-              <a:t>Multiple Workers can operate on the same queue</a:t>
-            </a:r>
-          </a:p>
-          <a:p>
-            <a:pPr lvl="1"/>
-            <a:r>
-              <a:rPr lang="en-US" dirty="0" smtClean="0"/>
-              <a:t>Round Robin Fashion by worker, not queue</a:t>
-            </a:r>
-          </a:p>
-          <a:p>
-            <a:pPr lvl="1"/>
-            <a:r>
-              <a:rPr lang="en-US" dirty="0" smtClean="0"/>
-              <a:t>Messages handled only by 1 instance of worker</a:t>
-            </a:r>
-          </a:p>
-          <a:p>
-            <a:r>
-              <a:rPr lang="en-US" dirty="0" smtClean="0"/>
-              <a:t>Similar to MSMQ as most know it minus the routing</a:t>
-            </a:r>
-          </a:p>
-          <a:p>
-            <a:pPr marL="457200" lvl="1" indent="0">
-              <a:buNone/>
-            </a:pPr>
+              <a:t>MSMQ</a:t>
+            </a:r>
+          </a:p>
+          <a:p>
+            <a:r>
+              <a:rPr lang="en-US" dirty="0" smtClean="0"/>
+              <a:t>Azure Queues</a:t>
+            </a:r>
+          </a:p>
+          <a:p>
+            <a:r>
+              <a:rPr lang="en-US" dirty="0" err="1" smtClean="0"/>
+              <a:t>RabbitMQ</a:t>
+            </a:r>
+            <a:r>
+              <a:rPr lang="en-US" dirty="0" smtClean="0"/>
+              <a:t> Direct Exchange with Queue Name as Routing Key</a:t>
+            </a:r>
             <a:endParaRPr lang="en-US" dirty="0"/>
           </a:p>
         </p:txBody>
@@ -7597,7 +6972,7 @@
     </p:spTree>
     <p:extLst>
       <p:ext uri="{BB962C8B-B14F-4D97-AF65-F5344CB8AC3E}">
-        <p14:creationId xmlns:p14="http://schemas.microsoft.com/office/powerpoint/2010/main" val="80833112"/>
+        <p14:creationId xmlns:p14="http://schemas.microsoft.com/office/powerpoint/2010/main" val="104389538"/>
       </p:ext>
     </p:extLst>
   </p:cSld>

</xml_diff>